<commit_message>
Updated lab assignments and rubrics
</commit_message>
<xml_diff>
--- a/Notes and Slides/CIS399Wk2Day3a-Themes+Styles.pptx
+++ b/Notes and Slides/CIS399Wk2Day3a-Themes+Styles.pptx
@@ -120,7 +120,7 @@
   </p:defaultTextStyle>
   <p:extLst>
     <p:ext uri="{EFAFB233-063F-42B5-8137-9DF3F51BA10A}">
-      <p15:sldGuideLst xmlns="" xmlns:p15="http://schemas.microsoft.com/office/powerpoint/2012/main">
+      <p15:sldGuideLst xmlns:p15="http://schemas.microsoft.com/office/powerpoint/2012/main">
         <p15:guide id="1" orient="horz" pos="2160">
           <p15:clr>
             <a:srgbClr val="A4A3A4"/>
@@ -219,7 +219,7 @@
           <a:p>
             <a:fld id="{1FC32AA1-1225-9048-80C3-2B6F58548154}" type="datetimeFigureOut">
               <a:rPr lang="en-US" smtClean="0"/>
-              <a:t>6/28/16</a:t>
+              <a:t>7/6/17</a:t>
             </a:fld>
             <a:endParaRPr lang="en-US"/>
           </a:p>
@@ -1060,7 +1060,7 @@
           <a:p>
             <a:fld id="{12110144-19AD-4D4E-902D-E18AF93089D3}" type="datetimeFigureOut">
               <a:rPr lang="en-US" smtClean="0"/>
-              <a:t>6/28/16</a:t>
+              <a:t>7/6/17</a:t>
             </a:fld>
             <a:endParaRPr lang="en-US"/>
           </a:p>
@@ -1230,7 +1230,7 @@
           <a:p>
             <a:fld id="{12110144-19AD-4D4E-902D-E18AF93089D3}" type="datetimeFigureOut">
               <a:rPr lang="en-US" smtClean="0"/>
-              <a:t>6/28/16</a:t>
+              <a:t>7/6/17</a:t>
             </a:fld>
             <a:endParaRPr lang="en-US"/>
           </a:p>
@@ -1410,7 +1410,7 @@
           <a:p>
             <a:fld id="{12110144-19AD-4D4E-902D-E18AF93089D3}" type="datetimeFigureOut">
               <a:rPr lang="en-US" smtClean="0"/>
-              <a:t>6/28/16</a:t>
+              <a:t>7/6/17</a:t>
             </a:fld>
             <a:endParaRPr lang="en-US"/>
           </a:p>
@@ -1580,7 +1580,7 @@
           <a:p>
             <a:fld id="{12110144-19AD-4D4E-902D-E18AF93089D3}" type="datetimeFigureOut">
               <a:rPr lang="en-US" smtClean="0"/>
-              <a:t>6/28/16</a:t>
+              <a:t>7/6/17</a:t>
             </a:fld>
             <a:endParaRPr lang="en-US"/>
           </a:p>
@@ -1826,7 +1826,7 @@
           <a:p>
             <a:fld id="{12110144-19AD-4D4E-902D-E18AF93089D3}" type="datetimeFigureOut">
               <a:rPr lang="en-US" smtClean="0"/>
-              <a:t>6/28/16</a:t>
+              <a:t>7/6/17</a:t>
             </a:fld>
             <a:endParaRPr lang="en-US"/>
           </a:p>
@@ -2114,7 +2114,7 @@
           <a:p>
             <a:fld id="{12110144-19AD-4D4E-902D-E18AF93089D3}" type="datetimeFigureOut">
               <a:rPr lang="en-US" smtClean="0"/>
-              <a:t>6/28/16</a:t>
+              <a:t>7/6/17</a:t>
             </a:fld>
             <a:endParaRPr lang="en-US"/>
           </a:p>
@@ -2536,7 +2536,7 @@
           <a:p>
             <a:fld id="{12110144-19AD-4D4E-902D-E18AF93089D3}" type="datetimeFigureOut">
               <a:rPr lang="en-US" smtClean="0"/>
-              <a:t>6/28/16</a:t>
+              <a:t>7/6/17</a:t>
             </a:fld>
             <a:endParaRPr lang="en-US"/>
           </a:p>
@@ -2654,7 +2654,7 @@
           <a:p>
             <a:fld id="{12110144-19AD-4D4E-902D-E18AF93089D3}" type="datetimeFigureOut">
               <a:rPr lang="en-US" smtClean="0"/>
-              <a:t>6/28/16</a:t>
+              <a:t>7/6/17</a:t>
             </a:fld>
             <a:endParaRPr lang="en-US"/>
           </a:p>
@@ -2749,7 +2749,7 @@
           <a:p>
             <a:fld id="{12110144-19AD-4D4E-902D-E18AF93089D3}" type="datetimeFigureOut">
               <a:rPr lang="en-US" smtClean="0"/>
-              <a:t>6/28/16</a:t>
+              <a:t>7/6/17</a:t>
             </a:fld>
             <a:endParaRPr lang="en-US"/>
           </a:p>
@@ -3026,7 +3026,7 @@
           <a:p>
             <a:fld id="{12110144-19AD-4D4E-902D-E18AF93089D3}" type="datetimeFigureOut">
               <a:rPr lang="en-US" smtClean="0"/>
-              <a:t>6/28/16</a:t>
+              <a:t>7/6/17</a:t>
             </a:fld>
             <a:endParaRPr lang="en-US"/>
           </a:p>
@@ -3279,7 +3279,7 @@
           <a:p>
             <a:fld id="{12110144-19AD-4D4E-902D-E18AF93089D3}" type="datetimeFigureOut">
               <a:rPr lang="en-US" smtClean="0"/>
-              <a:t>6/28/16</a:t>
+              <a:t>7/6/17</a:t>
             </a:fld>
             <a:endParaRPr lang="en-US"/>
           </a:p>
@@ -3510,7 +3510,7 @@
           <a:p>
             <a:fld id="{12110144-19AD-4D4E-902D-E18AF93089D3}" type="datetimeFigureOut">
               <a:rPr lang="en-US" smtClean="0"/>
-              <a:t>6/28/16</a:t>
+              <a:t>7/6/17</a:t>
             </a:fld>
             <a:endParaRPr lang="en-US"/>
           </a:p>
@@ -4355,14 +4355,14 @@
             <p:ph sz="half" idx="1"/>
             <p:extLst>
               <p:ext uri="{D42A27DB-BD31-4B8C-83A1-F6EECF244321}">
-                <p14:modId xmlns:p14="http://schemas.microsoft.com/office/powerpoint/2010/main" val="679392356"/>
+                <p14:modId xmlns:p14="http://schemas.microsoft.com/office/powerpoint/2010/main" val="1332717715"/>
               </p:ext>
             </p:extLst>
           </p:nvPr>
         </p:nvGraphicFramePr>
         <p:xfrm>
           <a:off x="457200" y="1600200"/>
-          <a:ext cx="3811200" cy="5152683"/>
+          <a:ext cx="3811200" cy="4725964"/>
         </p:xfrm>
         <a:graphic>
           <a:graphicData uri="http://schemas.openxmlformats.org/drawingml/2006/table">
@@ -4453,10 +4453,6 @@
                         <a:rPr lang="en-US" sz="2800" dirty="0" smtClean="0"/>
                         <a:t> </a:t>
                       </a:r>
-                      <a:r>
-                        <a:rPr lang="en-US" sz="2800" dirty="0" smtClean="0"/>
-                        <a:t/>
-                      </a:r>
                       <a:br>
                         <a:rPr lang="en-US" sz="2800" dirty="0" smtClean="0"/>
                       </a:br>
@@ -4508,15 +4504,7 @@
                       </a:pPr>
                       <a:r>
                         <a:rPr lang="en-US" sz="2800" dirty="0" smtClean="0"/>
-                        <a:t>Activity </a:t>
-                      </a:r>
-                      <a:r>
-                        <a:rPr lang="en-US" sz="2800" dirty="0" smtClean="0"/>
-                        <a:t>Lifecycle, </a:t>
-                      </a:r>
-                      <a:r>
-                        <a:rPr lang="en-US" sz="2800" dirty="0" smtClean="0"/>
-                        <a:t>saving</a:t>
+                        <a:t>Activity Lifecycle, saving</a:t>
                       </a:r>
                       <a:r>
                         <a:rPr lang="en-US" sz="2800" baseline="0" dirty="0" smtClean="0"/>
@@ -4727,11 +4715,7 @@
                       </a:r>
                       <a:r>
                         <a:rPr lang="en-US" sz="2800" baseline="0" dirty="0" smtClean="0"/>
-                        <a:t> </a:t>
-                      </a:r>
-                      <a:r>
-                        <a:rPr lang="en-US" sz="2800" baseline="0" dirty="0" smtClean="0"/>
-                        <a:t>apps, Fragments</a:t>
+                        <a:t> apps, </a:t>
                       </a:r>
                       <a:endParaRPr lang="en-US" sz="2800" dirty="0" smtClean="0"/>
                     </a:p>
@@ -4753,14 +4737,14 @@
             <p:ph sz="half" idx="2"/>
             <p:extLst>
               <p:ext uri="{D42A27DB-BD31-4B8C-83A1-F6EECF244321}">
-                <p14:modId xmlns:p14="http://schemas.microsoft.com/office/powerpoint/2010/main" val="3112258889"/>
+                <p14:modId xmlns:p14="http://schemas.microsoft.com/office/powerpoint/2010/main" val="1409875500"/>
               </p:ext>
             </p:extLst>
           </p:nvPr>
         </p:nvGraphicFramePr>
         <p:xfrm>
           <a:off x="4412426" y="1600200"/>
-          <a:ext cx="4274374" cy="3866745"/>
+          <a:ext cx="4274374" cy="4725965"/>
         </p:xfrm>
         <a:graphic>
           <a:graphicData uri="http://schemas.openxmlformats.org/drawingml/2006/table">
@@ -4772,7 +4756,7 @@
                 <a:gridCol w="589196"/>
                 <a:gridCol w="3685178"/>
               </a:tblGrid>
-              <a:tr h="375862">
+              <a:tr h="401996">
                 <a:tc>
                   <a:txBody>
                     <a:bodyPr/>
@@ -4802,7 +4786,54 @@
                   <a:tcPr/>
                 </a:tc>
               </a:tr>
-              <a:tr h="957676">
+              <a:tr h="590364">
+                <a:tc>
+                  <a:txBody>
+                    <a:bodyPr/>
+                    <a:lstStyle/>
+                    <a:p>
+                      <a:r>
+                        <a:rPr lang="en-US" sz="2800" dirty="0" smtClean="0"/>
+                        <a:t>3</a:t>
+                      </a:r>
+                      <a:endParaRPr lang="en-US" sz="2800" dirty="0"/>
+                    </a:p>
+                  </a:txBody>
+                  <a:tcPr/>
+                </a:tc>
+                <a:tc>
+                  <a:txBody>
+                    <a:bodyPr/>
+                    <a:lstStyle/>
+                    <a:p>
+                      <a:pPr marL="0" marR="0" indent="0" algn="l" defTabSz="457200" rtl="0" eaLnBrk="1" fontAlgn="auto" latinLnBrk="0" hangingPunct="1">
+                        <a:lnSpc>
+                          <a:spcPct val="100000"/>
+                        </a:lnSpc>
+                        <a:spcBef>
+                          <a:spcPts val="0"/>
+                        </a:spcBef>
+                        <a:spcAft>
+                          <a:spcPts val="0"/>
+                        </a:spcAft>
+                        <a:buClrTx/>
+                        <a:buSzTx/>
+                        <a:buFontTx/>
+                        <a:buNone/>
+                        <a:tabLst/>
+                        <a:defRPr/>
+                      </a:pPr>
+                      <a:r>
+                        <a:rPr lang="en-US" sz="2800" dirty="0" smtClean="0"/>
+                        <a:t>Fragments</a:t>
+                      </a:r>
+                      <a:endParaRPr lang="en-US" sz="2800" dirty="0" smtClean="0"/>
+                    </a:p>
+                  </a:txBody>
+                  <a:tcPr/>
+                </a:tc>
+              </a:tr>
+              <a:tr h="1024263">
                 <a:tc>
                   <a:txBody>
                     <a:bodyPr/>
@@ -4841,11 +4872,7 @@
                       </a:pPr>
                       <a:r>
                         <a:rPr lang="en-US" sz="2800" baseline="0" dirty="0" smtClean="0"/>
-                        <a:t>Reading XML </a:t>
-                      </a:r>
-                      <a:r>
-                        <a:rPr lang="en-US" sz="2800" baseline="0" smtClean="0"/>
-                        <a:t>files,</a:t>
+                        <a:t>Reading XML files,</a:t>
                       </a:r>
                     </a:p>
                     <a:p>
@@ -4867,12 +4894,12 @@
                         <a:defRPr/>
                       </a:pPr>
                       <a:r>
-                        <a:rPr lang="en-US" sz="2800" baseline="0" smtClean="0"/>
-                        <a:t>Asynch </a:t>
+                        <a:rPr lang="en-US" sz="2800" baseline="0" dirty="0" err="1" smtClean="0"/>
+                        <a:t>Asynch</a:t>
                       </a:r>
                       <a:r>
                         <a:rPr lang="en-US" sz="2800" baseline="0" dirty="0" smtClean="0"/>
-                        <a:t>Tasks</a:t>
+                        <a:t> Tasks</a:t>
                       </a:r>
                       <a:endParaRPr lang="en-US" sz="2800" dirty="0" smtClean="0"/>
                     </a:p>
@@ -4880,7 +4907,7 @@
                   <a:tcPr/>
                 </a:tc>
               </a:tr>
-              <a:tr h="525177">
+              <a:tr h="561693">
                 <a:tc>
                   <a:txBody>
                     <a:bodyPr/>
@@ -4926,7 +4953,7 @@
                   <a:tcPr/>
                 </a:tc>
               </a:tr>
-              <a:tr h="525177">
+              <a:tr h="561693">
                 <a:tc>
                   <a:txBody>
                     <a:bodyPr/>
@@ -4977,7 +5004,7 @@
                   <a:tcPr/>
                 </a:tc>
               </a:tr>
-              <a:tr h="957676">
+              <a:tr h="1024263">
                 <a:tc>
                   <a:txBody>
                     <a:bodyPr/>
@@ -5023,7 +5050,7 @@
                   <a:tcPr/>
                 </a:tc>
               </a:tr>
-              <a:tr h="525177">
+              <a:tr h="561693">
                 <a:tc>
                   <a:txBody>
                     <a:bodyPr/>
@@ -5113,33 +5140,46 @@
             <p:ph type="title"/>
           </p:nvPr>
         </p:nvSpPr>
-        <p:spPr/>
-        <p:txBody>
-          <a:bodyPr/>
-          <a:lstStyle/>
-          <a:p>
-            <a:r>
-              <a:rPr lang="en-US" dirty="0" smtClean="0"/>
-              <a:t>What You Need to Know</a:t>
-            </a:r>
-            <a:endParaRPr lang="en-US" dirty="0"/>
-          </a:p>
-        </p:txBody>
-      </p:sp>
-      <p:sp>
-        <p:nvSpPr>
-          <p:cNvPr id="6" name="Content Placeholder 5"/>
-          <p:cNvSpPr>
-            <a:spLocks noGrp="1"/>
-          </p:cNvSpPr>
-          <p:nvPr>
-            <p:ph idx="1"/>
-          </p:nvPr>
-        </p:nvSpPr>
         <p:spPr>
           <a:xfrm>
-            <a:off x="457200" y="1450295"/>
-            <a:ext cx="8229600" cy="4648248"/>
+            <a:off x="457200" y="274638"/>
+            <a:ext cx="8229600" cy="962491"/>
+          </a:xfrm>
+        </p:spPr>
+        <p:txBody>
+          <a:bodyPr/>
+          <a:lstStyle/>
+          <a:p>
+            <a:r>
+              <a:rPr lang="en-US" dirty="0" smtClean="0">
+                <a:solidFill>
+                  <a:srgbClr val="0208F2"/>
+                </a:solidFill>
+              </a:rPr>
+              <a:t>What You Need to Know</a:t>
+            </a:r>
+            <a:endParaRPr lang="en-US" dirty="0">
+              <a:solidFill>
+                <a:srgbClr val="0208F2"/>
+              </a:solidFill>
+            </a:endParaRPr>
+          </a:p>
+        </p:txBody>
+      </p:sp>
+      <p:sp>
+        <p:nvSpPr>
+          <p:cNvPr id="6" name="Content Placeholder 5"/>
+          <p:cNvSpPr>
+            <a:spLocks noGrp="1"/>
+          </p:cNvSpPr>
+          <p:nvPr>
+            <p:ph idx="1"/>
+          </p:nvPr>
+        </p:nvSpPr>
+        <p:spPr>
+          <a:xfrm>
+            <a:off x="457200" y="1237129"/>
+            <a:ext cx="8229600" cy="4861414"/>
           </a:xfrm>
         </p:spPr>
         <p:txBody>
@@ -5150,21 +5190,29 @@
           <a:p>
             <a:r>
               <a:rPr lang="en-US" dirty="0" smtClean="0"/>
-              <a:t>What themes and settings are:</a:t>
+              <a:t>What </a:t>
+            </a:r>
+            <a:r>
+              <a:rPr lang="en-US" dirty="0" smtClean="0"/>
+              <a:t>styles and themes are</a:t>
+            </a:r>
+            <a:r>
+              <a:rPr lang="en-US" dirty="0" smtClean="0"/>
+              <a:t>:</a:t>
             </a:r>
           </a:p>
           <a:p>
             <a:pPr lvl="2"/>
             <a:r>
-              <a:rPr lang="en-US" dirty="0" smtClean="0"/>
+              <a:rPr lang="en-US" sz="2600" dirty="0" smtClean="0"/>
               <a:t>A Style is a collection of properties applied to a view (widget or layout)</a:t>
             </a:r>
-            <a:endParaRPr lang="en-US" dirty="0"/>
+            <a:endParaRPr lang="en-US" sz="2600" dirty="0"/>
           </a:p>
           <a:p>
             <a:pPr lvl="2"/>
             <a:r>
-              <a:rPr lang="en-US" dirty="0" smtClean="0"/>
+              <a:rPr lang="en-US" sz="2600" dirty="0" smtClean="0"/>
               <a:t>A theme is a collection of properties applied to an activity or an app</a:t>
             </a:r>
           </a:p>
@@ -5185,18 +5233,18 @@
           <a:p>
             <a:pPr lvl="1"/>
             <a:r>
-              <a:rPr lang="en-US" dirty="0" smtClean="0"/>
+              <a:rPr lang="en-US" sz="2600" dirty="0" smtClean="0"/>
               <a:t>They affect the appearance,</a:t>
             </a:r>
             <a:r>
-              <a:rPr lang="en-US" dirty="0"/>
+              <a:rPr lang="en-US" sz="2600" dirty="0"/>
               <a:t> </a:t>
             </a:r>
             <a:r>
-              <a:rPr lang="en-US" dirty="0" smtClean="0"/>
+              <a:rPr lang="en-US" sz="2600" dirty="0" smtClean="0"/>
               <a:t>but not the functionality</a:t>
             </a:r>
-            <a:endParaRPr lang="en-US" dirty="0"/>
+            <a:endParaRPr lang="en-US" sz="2600" dirty="0"/>
           </a:p>
           <a:p>
             <a:r>
@@ -5207,14 +5255,19 @@
           <a:p>
             <a:pPr lvl="1"/>
             <a:r>
-              <a:rPr lang="en-US" dirty="0" smtClean="0"/>
-              <a:t>Add a style attribute to an AXML element</a:t>
-            </a:r>
+              <a:rPr lang="en-US" sz="2600" dirty="0" smtClean="0"/>
+              <a:t>Add a style attribute to an </a:t>
+            </a:r>
+            <a:r>
+              <a:rPr lang="en-US" sz="2600" dirty="0" smtClean="0"/>
+              <a:t>XML layout element</a:t>
+            </a:r>
+            <a:endParaRPr lang="en-US" sz="2600" dirty="0" smtClean="0"/>
           </a:p>
           <a:p>
             <a:pPr lvl="1"/>
             <a:r>
-              <a:rPr lang="en-US" dirty="0" smtClean="0"/>
+              <a:rPr lang="en-US" sz="2600" dirty="0" smtClean="0"/>
               <a:t>Add a theme attribute to an activity or application element in the manifest</a:t>
             </a:r>
           </a:p>
@@ -5384,12 +5437,12 @@
           <a:graphicData uri="http://schemas.openxmlformats.org/presentationml/2006/ole">
             <mc:AlternateContent xmlns:mc="http://schemas.openxmlformats.org/markup-compatibility/2006">
               <mc:Choice xmlns:v="urn:schemas-microsoft-com:vml" Requires="v">
-                <p:oleObj spid="_x0000_s1029" name="Document" r:id="rId4" imgW="7487205" imgH="5817491" progId="Word.Document.12">
+                <p:oleObj spid="_x0000_s1031" name="Document" r:id="rId5" imgW="7487205" imgH="5817491" progId="Word.Document.12">
                   <p:embed/>
                 </p:oleObj>
               </mc:Choice>
               <mc:Fallback>
-                <p:oleObj name="Document" r:id="rId4" imgW="7487205" imgH="5817491" progId="Word.Document.12">
+                <p:oleObj name="Document" r:id="rId5" imgW="7487205" imgH="5817491" progId="Word.Document.12">
                   <p:embed/>
                   <p:pic>
                     <p:nvPicPr>
@@ -5398,7 +5451,7 @@
                       <p:nvPr/>
                     </p:nvPicPr>
                     <p:blipFill>
-                      <a:blip r:embed="rId5"/>
+                      <a:blip r:embed="rId6"/>
                       <a:stretch>
                         <a:fillRect/>
                       </a:stretch>
@@ -5459,16 +5512,29 @@
             <p:ph type="title"/>
           </p:nvPr>
         </p:nvSpPr>
-        <p:spPr/>
-        <p:txBody>
-          <a:bodyPr/>
-          <a:lstStyle/>
-          <a:p>
-            <a:r>
-              <a:rPr lang="en-US" dirty="0" smtClean="0"/>
+        <p:spPr>
+          <a:xfrm>
+            <a:off x="457200" y="274638"/>
+            <a:ext cx="8229600" cy="876430"/>
+          </a:xfrm>
+        </p:spPr>
+        <p:txBody>
+          <a:bodyPr/>
+          <a:lstStyle/>
+          <a:p>
+            <a:r>
+              <a:rPr lang="en-US" dirty="0" smtClean="0">
+                <a:solidFill>
+                  <a:srgbClr val="0208F2"/>
+                </a:solidFill>
+              </a:rPr>
               <a:t>Material Design</a:t>
             </a:r>
-            <a:endParaRPr lang="en-US" dirty="0"/>
+            <a:endParaRPr lang="en-US" dirty="0">
+              <a:solidFill>
+                <a:srgbClr val="0208F2"/>
+              </a:solidFill>
+            </a:endParaRPr>
           </a:p>
         </p:txBody>
       </p:sp>
@@ -5482,10 +5548,15 @@
             <p:ph idx="1"/>
           </p:nvPr>
         </p:nvSpPr>
-        <p:spPr/>
+        <p:spPr>
+          <a:xfrm>
+            <a:off x="457200" y="1151068"/>
+            <a:ext cx="8229600" cy="4975095"/>
+          </a:xfrm>
+        </p:spPr>
         <p:txBody>
           <a:bodyPr>
-            <a:normAutofit fontScale="77500" lnSpcReduction="20000"/>
+            <a:normAutofit fontScale="85000" lnSpcReduction="20000"/>
           </a:bodyPr>
           <a:lstStyle/>
           <a:p>
@@ -5499,7 +5570,15 @@
             </a:r>
             <a:r>
               <a:rPr lang="en-US" dirty="0"/>
-              <a:t>To use material design in your Android apps, follow the guidelines described in the material design specification and use the new components and functionality available in Android </a:t>
+              <a:t>To use material design in your Android apps, follow the guidelines described in the material design specification and use the </a:t>
+            </a:r>
+            <a:r>
+              <a:rPr lang="en-US" dirty="0" smtClean="0"/>
+              <a:t>components </a:t>
+            </a:r>
+            <a:r>
+              <a:rPr lang="en-US" dirty="0"/>
+              <a:t>and functionality available in Android </a:t>
             </a:r>
             <a:r>
               <a:rPr lang="en-US" dirty="0" smtClean="0"/>
@@ -5507,8 +5586,13 @@
             </a:r>
             <a:r>
               <a:rPr lang="en-US" dirty="0"/>
-              <a:t>(API level 21).</a:t>
-            </a:r>
+              <a:t>(API level 21</a:t>
+            </a:r>
+            <a:r>
+              <a:rPr lang="en-US" dirty="0" smtClean="0"/>
+              <a:t>) and newer.</a:t>
+            </a:r>
+            <a:endParaRPr lang="en-US" dirty="0"/>
           </a:p>
           <a:p>
             <a:endParaRPr lang="en-US" dirty="0"/>
@@ -5656,7 +5740,15 @@
             </a:pPr>
             <a:r>
               <a:rPr lang="en-US" dirty="0"/>
-              <a:t>The new material theme provides</a:t>
+              <a:t>The </a:t>
+            </a:r>
+            <a:r>
+              <a:rPr lang="en-US" dirty="0" smtClean="0"/>
+              <a:t>material </a:t>
+            </a:r>
+            <a:r>
+              <a:rPr lang="en-US" dirty="0"/>
+              <a:t>theme provides</a:t>
             </a:r>
             <a:r>
               <a:rPr lang="en-US" dirty="0" smtClean="0"/>

</xml_diff>

<commit_message>
Updates to slides and lab instrucitons
</commit_message>
<xml_diff>
--- a/Notes and Slides/CIS399Wk2Day3a-Themes+Styles.pptx
+++ b/Notes and Slides/CIS399Wk2Day3a-Themes+Styles.pptx
@@ -5,21 +5,26 @@
     <p:sldMasterId id="2147483648" r:id="rId1"/>
   </p:sldMasterIdLst>
   <p:notesMasterIdLst>
-    <p:notesMasterId r:id="rId14"/>
+    <p:notesMasterId r:id="rId19"/>
   </p:notesMasterIdLst>
   <p:sldIdLst>
     <p:sldId id="256" r:id="rId2"/>
     <p:sldId id="268" r:id="rId3"/>
     <p:sldId id="269" r:id="rId4"/>
-    <p:sldId id="270" r:id="rId5"/>
-    <p:sldId id="271" r:id="rId6"/>
-    <p:sldId id="272" r:id="rId7"/>
-    <p:sldId id="273" r:id="rId8"/>
-    <p:sldId id="274" r:id="rId9"/>
-    <p:sldId id="275" r:id="rId10"/>
-    <p:sldId id="276" r:id="rId11"/>
-    <p:sldId id="277" r:id="rId12"/>
-    <p:sldId id="278" r:id="rId13"/>
+    <p:sldId id="279" r:id="rId5"/>
+    <p:sldId id="280" r:id="rId6"/>
+    <p:sldId id="281" r:id="rId7"/>
+    <p:sldId id="283" r:id="rId8"/>
+    <p:sldId id="282" r:id="rId9"/>
+    <p:sldId id="270" r:id="rId10"/>
+    <p:sldId id="271" r:id="rId11"/>
+    <p:sldId id="272" r:id="rId12"/>
+    <p:sldId id="273" r:id="rId13"/>
+    <p:sldId id="274" r:id="rId14"/>
+    <p:sldId id="275" r:id="rId15"/>
+    <p:sldId id="276" r:id="rId16"/>
+    <p:sldId id="277" r:id="rId17"/>
+    <p:sldId id="278" r:id="rId18"/>
   </p:sldIdLst>
   <p:sldSz cx="9144000" cy="6858000" type="screen4x3"/>
   <p:notesSz cx="6858000" cy="9144000"/>
@@ -219,7 +224,7 @@
           <a:p>
             <a:fld id="{1FC32AA1-1225-9048-80C3-2B6F58548154}" type="datetimeFigureOut">
               <a:rPr lang="en-US" smtClean="0"/>
-              <a:t>6/28/18</a:t>
+              <a:t>6/29/18</a:t>
             </a:fld>
             <a:endParaRPr lang="en-US"/>
           </a:p>
@@ -640,7 +645,23 @@
           <a:p>
             <a:r>
               <a:rPr lang="en-US" dirty="0"/>
-              <a:t>Three common themes, and the ones used in the textbook</a:t>
+              <a:t>https://</a:t>
+            </a:r>
+            <a:r>
+              <a:rPr lang="en-US" dirty="0" err="1"/>
+              <a:t>developer.android.com</a:t>
+            </a:r>
+            <a:r>
+              <a:rPr lang="en-US" dirty="0"/>
+              <a:t>/guide/topics/</a:t>
+            </a:r>
+            <a:r>
+              <a:rPr lang="en-US" dirty="0" err="1"/>
+              <a:t>ui</a:t>
+            </a:r>
+            <a:r>
+              <a:rPr lang="en-US" dirty="0"/>
+              <a:t>/look-and-feel/themes</a:t>
             </a:r>
           </a:p>
         </p:txBody>
@@ -671,7 +692,7 @@
     </p:spTree>
     <p:extLst>
       <p:ext uri="{BB962C8B-B14F-4D97-AF65-F5344CB8AC3E}">
-        <p14:creationId xmlns:p14="http://schemas.microsoft.com/office/powerpoint/2010/main" val="2992178698"/>
+        <p14:creationId xmlns:p14="http://schemas.microsoft.com/office/powerpoint/2010/main" val="825656387"/>
       </p:ext>
     </p:extLst>
   </p:cSld>
@@ -725,22 +746,6 @@
           <a:bodyPr/>
           <a:lstStyle/>
           <a:p>
-            <a:r>
-              <a:rPr lang="en-US" dirty="0"/>
-              <a:t>https://</a:t>
-            </a:r>
-            <a:r>
-              <a:rPr lang="en-US" dirty="0" err="1"/>
-              <a:t>developer.android.com</a:t>
-            </a:r>
-            <a:r>
-              <a:rPr lang="en-US" dirty="0"/>
-              <a:t>/training/material/</a:t>
-            </a:r>
-            <a:r>
-              <a:rPr lang="en-US" dirty="0" err="1"/>
-              <a:t>index.html</a:t>
-            </a:r>
             <a:endParaRPr lang="en-US" dirty="0"/>
           </a:p>
         </p:txBody>
@@ -771,7 +776,7 @@
     </p:spTree>
     <p:extLst>
       <p:ext uri="{BB962C8B-B14F-4D97-AF65-F5344CB8AC3E}">
-        <p14:creationId xmlns:p14="http://schemas.microsoft.com/office/powerpoint/2010/main" val="588937274"/>
+        <p14:creationId xmlns:p14="http://schemas.microsoft.com/office/powerpoint/2010/main" val="218881575"/>
       </p:ext>
     </p:extLst>
   </p:cSld>
@@ -827,6 +832,493 @@
           <a:p>
             <a:r>
               <a:rPr lang="en-US" dirty="0"/>
+              <a:t>https://</a:t>
+            </a:r>
+            <a:r>
+              <a:rPr lang="en-US" dirty="0" err="1"/>
+              <a:t>developer.android.com</a:t>
+            </a:r>
+            <a:r>
+              <a:rPr lang="en-US" dirty="0"/>
+              <a:t>/guide/topics/</a:t>
+            </a:r>
+            <a:r>
+              <a:rPr lang="en-US" dirty="0" err="1"/>
+              <a:t>ui</a:t>
+            </a:r>
+            <a:r>
+              <a:rPr lang="en-US" dirty="0"/>
+              <a:t>/look-and-feel/</a:t>
+            </a:r>
+            <a:r>
+              <a:rPr lang="en-US" dirty="0" err="1"/>
+              <a:t>themes#Theme</a:t>
+            </a:r>
+            <a:endParaRPr lang="en-US" dirty="0"/>
+          </a:p>
+        </p:txBody>
+      </p:sp>
+      <p:sp>
+        <p:nvSpPr>
+          <p:cNvPr id="4" name="Slide Number Placeholder 3"/>
+          <p:cNvSpPr>
+            <a:spLocks noGrp="1"/>
+          </p:cNvSpPr>
+          <p:nvPr>
+            <p:ph type="sldNum" sz="quarter" idx="10"/>
+          </p:nvPr>
+        </p:nvSpPr>
+        <p:spPr/>
+        <p:txBody>
+          <a:bodyPr/>
+          <a:lstStyle/>
+          <a:p>
+            <a:fld id="{44EB6C7D-DFD8-944D-93E3-D07F7EBDDEA8}" type="slidenum">
+              <a:rPr lang="en-US" smtClean="0"/>
+              <a:t>6</a:t>
+            </a:fld>
+            <a:endParaRPr lang="en-US"/>
+          </a:p>
+        </p:txBody>
+      </p:sp>
+    </p:spTree>
+    <p:extLst>
+      <p:ext uri="{BB962C8B-B14F-4D97-AF65-F5344CB8AC3E}">
+        <p14:creationId xmlns:p14="http://schemas.microsoft.com/office/powerpoint/2010/main" val="1617487565"/>
+      </p:ext>
+    </p:extLst>
+  </p:cSld>
+  <p:clrMapOvr>
+    <a:masterClrMapping/>
+  </p:clrMapOvr>
+</p:notes>
+</file>
+
+<file path=ppt/notesSlides/notesSlide5.xml><?xml version="1.0" encoding="utf-8"?>
+<p:notes xmlns:a="http://schemas.openxmlformats.org/drawingml/2006/main" xmlns:r="http://schemas.openxmlformats.org/officeDocument/2006/relationships" xmlns:p="http://schemas.openxmlformats.org/presentationml/2006/main">
+  <p:cSld>
+    <p:spTree>
+      <p:nvGrpSpPr>
+        <p:cNvPr id="1" name=""/>
+        <p:cNvGrpSpPr/>
+        <p:nvPr/>
+      </p:nvGrpSpPr>
+      <p:grpSpPr>
+        <a:xfrm>
+          <a:off x="0" y="0"/>
+          <a:ext cx="0" cy="0"/>
+          <a:chOff x="0" y="0"/>
+          <a:chExt cx="0" cy="0"/>
+        </a:xfrm>
+      </p:grpSpPr>
+      <p:sp>
+        <p:nvSpPr>
+          <p:cNvPr id="2" name="Slide Image Placeholder 1"/>
+          <p:cNvSpPr>
+            <a:spLocks noGrp="1" noRot="1" noChangeAspect="1"/>
+          </p:cNvSpPr>
+          <p:nvPr>
+            <p:ph type="sldImg"/>
+          </p:nvPr>
+        </p:nvSpPr>
+        <p:spPr/>
+      </p:sp>
+      <p:sp>
+        <p:nvSpPr>
+          <p:cNvPr id="3" name="Notes Placeholder 2"/>
+          <p:cNvSpPr>
+            <a:spLocks noGrp="1"/>
+          </p:cNvSpPr>
+          <p:nvPr>
+            <p:ph type="body" idx="1"/>
+          </p:nvPr>
+        </p:nvSpPr>
+        <p:spPr/>
+        <p:txBody>
+          <a:bodyPr/>
+          <a:lstStyle/>
+          <a:p>
+            <a:r>
+              <a:rPr lang="en-US" dirty="0"/>
+              <a:t>https://</a:t>
+            </a:r>
+            <a:r>
+              <a:rPr lang="en-US" dirty="0" err="1"/>
+              <a:t>developer.android.com</a:t>
+            </a:r>
+            <a:r>
+              <a:rPr lang="en-US" dirty="0"/>
+              <a:t>/guide/topics/</a:t>
+            </a:r>
+            <a:r>
+              <a:rPr lang="en-US" dirty="0" err="1"/>
+              <a:t>ui</a:t>
+            </a:r>
+            <a:r>
+              <a:rPr lang="en-US" dirty="0"/>
+              <a:t>/look-and-feel/</a:t>
+            </a:r>
+            <a:r>
+              <a:rPr lang="en-US" dirty="0" err="1"/>
+              <a:t>themes#Theme</a:t>
+            </a:r>
+            <a:endParaRPr lang="en-US" dirty="0"/>
+          </a:p>
+        </p:txBody>
+      </p:sp>
+      <p:sp>
+        <p:nvSpPr>
+          <p:cNvPr id="4" name="Slide Number Placeholder 3"/>
+          <p:cNvSpPr>
+            <a:spLocks noGrp="1"/>
+          </p:cNvSpPr>
+          <p:nvPr>
+            <p:ph type="sldNum" sz="quarter" idx="10"/>
+          </p:nvPr>
+        </p:nvSpPr>
+        <p:spPr/>
+        <p:txBody>
+          <a:bodyPr/>
+          <a:lstStyle/>
+          <a:p>
+            <a:fld id="{44EB6C7D-DFD8-944D-93E3-D07F7EBDDEA8}" type="slidenum">
+              <a:rPr lang="en-US" smtClean="0"/>
+              <a:t>7</a:t>
+            </a:fld>
+            <a:endParaRPr lang="en-US"/>
+          </a:p>
+        </p:txBody>
+      </p:sp>
+    </p:spTree>
+    <p:extLst>
+      <p:ext uri="{BB962C8B-B14F-4D97-AF65-F5344CB8AC3E}">
+        <p14:creationId xmlns:p14="http://schemas.microsoft.com/office/powerpoint/2010/main" val="717650539"/>
+      </p:ext>
+    </p:extLst>
+  </p:cSld>
+  <p:clrMapOvr>
+    <a:masterClrMapping/>
+  </p:clrMapOvr>
+</p:notes>
+</file>
+
+<file path=ppt/notesSlides/notesSlide6.xml><?xml version="1.0" encoding="utf-8"?>
+<p:notes xmlns:a="http://schemas.openxmlformats.org/drawingml/2006/main" xmlns:r="http://schemas.openxmlformats.org/officeDocument/2006/relationships" xmlns:p="http://schemas.openxmlformats.org/presentationml/2006/main">
+  <p:cSld>
+    <p:spTree>
+      <p:nvGrpSpPr>
+        <p:cNvPr id="1" name=""/>
+        <p:cNvGrpSpPr/>
+        <p:nvPr/>
+      </p:nvGrpSpPr>
+      <p:grpSpPr>
+        <a:xfrm>
+          <a:off x="0" y="0"/>
+          <a:ext cx="0" cy="0"/>
+          <a:chOff x="0" y="0"/>
+          <a:chExt cx="0" cy="0"/>
+        </a:xfrm>
+      </p:grpSpPr>
+      <p:sp>
+        <p:nvSpPr>
+          <p:cNvPr id="2" name="Slide Image Placeholder 1"/>
+          <p:cNvSpPr>
+            <a:spLocks noGrp="1" noRot="1" noChangeAspect="1"/>
+          </p:cNvSpPr>
+          <p:nvPr>
+            <p:ph type="sldImg"/>
+          </p:nvPr>
+        </p:nvSpPr>
+        <p:spPr/>
+      </p:sp>
+      <p:sp>
+        <p:nvSpPr>
+          <p:cNvPr id="3" name="Notes Placeholder 2"/>
+          <p:cNvSpPr>
+            <a:spLocks noGrp="1"/>
+          </p:cNvSpPr>
+          <p:nvPr>
+            <p:ph type="body" idx="1"/>
+          </p:nvPr>
+        </p:nvSpPr>
+        <p:spPr/>
+        <p:txBody>
+          <a:bodyPr/>
+          <a:lstStyle/>
+          <a:p>
+            <a:endParaRPr lang="en-US" dirty="0"/>
+          </a:p>
+        </p:txBody>
+      </p:sp>
+      <p:sp>
+        <p:nvSpPr>
+          <p:cNvPr id="4" name="Slide Number Placeholder 3"/>
+          <p:cNvSpPr>
+            <a:spLocks noGrp="1"/>
+          </p:cNvSpPr>
+          <p:nvPr>
+            <p:ph type="sldNum" sz="quarter" idx="10"/>
+          </p:nvPr>
+        </p:nvSpPr>
+        <p:spPr/>
+        <p:txBody>
+          <a:bodyPr/>
+          <a:lstStyle/>
+          <a:p>
+            <a:fld id="{44EB6C7D-DFD8-944D-93E3-D07F7EBDDEA8}" type="slidenum">
+              <a:rPr lang="en-US" smtClean="0"/>
+              <a:t>8</a:t>
+            </a:fld>
+            <a:endParaRPr lang="en-US"/>
+          </a:p>
+        </p:txBody>
+      </p:sp>
+    </p:spTree>
+    <p:extLst>
+      <p:ext uri="{BB962C8B-B14F-4D97-AF65-F5344CB8AC3E}">
+        <p14:creationId xmlns:p14="http://schemas.microsoft.com/office/powerpoint/2010/main" val="3564868256"/>
+      </p:ext>
+    </p:extLst>
+  </p:cSld>
+  <p:clrMapOvr>
+    <a:masterClrMapping/>
+  </p:clrMapOvr>
+</p:notes>
+</file>
+
+<file path=ppt/notesSlides/notesSlide7.xml><?xml version="1.0" encoding="utf-8"?>
+<p:notes xmlns:a="http://schemas.openxmlformats.org/drawingml/2006/main" xmlns:r="http://schemas.openxmlformats.org/officeDocument/2006/relationships" xmlns:p="http://schemas.openxmlformats.org/presentationml/2006/main">
+  <p:cSld>
+    <p:spTree>
+      <p:nvGrpSpPr>
+        <p:cNvPr id="1" name=""/>
+        <p:cNvGrpSpPr/>
+        <p:nvPr/>
+      </p:nvGrpSpPr>
+      <p:grpSpPr>
+        <a:xfrm>
+          <a:off x="0" y="0"/>
+          <a:ext cx="0" cy="0"/>
+          <a:chOff x="0" y="0"/>
+          <a:chExt cx="0" cy="0"/>
+        </a:xfrm>
+      </p:grpSpPr>
+      <p:sp>
+        <p:nvSpPr>
+          <p:cNvPr id="2" name="Slide Image Placeholder 1"/>
+          <p:cNvSpPr>
+            <a:spLocks noGrp="1" noRot="1" noChangeAspect="1"/>
+          </p:cNvSpPr>
+          <p:nvPr>
+            <p:ph type="sldImg"/>
+          </p:nvPr>
+        </p:nvSpPr>
+        <p:spPr/>
+      </p:sp>
+      <p:sp>
+        <p:nvSpPr>
+          <p:cNvPr id="3" name="Notes Placeholder 2"/>
+          <p:cNvSpPr>
+            <a:spLocks noGrp="1"/>
+          </p:cNvSpPr>
+          <p:nvPr>
+            <p:ph type="body" idx="1"/>
+          </p:nvPr>
+        </p:nvSpPr>
+        <p:spPr/>
+        <p:txBody>
+          <a:bodyPr/>
+          <a:lstStyle/>
+          <a:p>
+            <a:r>
+              <a:rPr lang="en-US" dirty="0"/>
+              <a:t>Three common themes, and the ones used in the textbook</a:t>
+            </a:r>
+          </a:p>
+        </p:txBody>
+      </p:sp>
+      <p:sp>
+        <p:nvSpPr>
+          <p:cNvPr id="4" name="Slide Number Placeholder 3"/>
+          <p:cNvSpPr>
+            <a:spLocks noGrp="1"/>
+          </p:cNvSpPr>
+          <p:nvPr>
+            <p:ph type="sldNum" sz="quarter" idx="10"/>
+          </p:nvPr>
+        </p:nvSpPr>
+        <p:spPr/>
+        <p:txBody>
+          <a:bodyPr/>
+          <a:lstStyle/>
+          <a:p>
+            <a:fld id="{44EB6C7D-DFD8-944D-93E3-D07F7EBDDEA8}" type="slidenum">
+              <a:rPr lang="en-US" smtClean="0"/>
+              <a:t>9</a:t>
+            </a:fld>
+            <a:endParaRPr lang="en-US"/>
+          </a:p>
+        </p:txBody>
+      </p:sp>
+    </p:spTree>
+    <p:extLst>
+      <p:ext uri="{BB962C8B-B14F-4D97-AF65-F5344CB8AC3E}">
+        <p14:creationId xmlns:p14="http://schemas.microsoft.com/office/powerpoint/2010/main" val="2992178698"/>
+      </p:ext>
+    </p:extLst>
+  </p:cSld>
+  <p:clrMapOvr>
+    <a:masterClrMapping/>
+  </p:clrMapOvr>
+</p:notes>
+</file>
+
+<file path=ppt/notesSlides/notesSlide8.xml><?xml version="1.0" encoding="utf-8"?>
+<p:notes xmlns:a="http://schemas.openxmlformats.org/drawingml/2006/main" xmlns:r="http://schemas.openxmlformats.org/officeDocument/2006/relationships" xmlns:p="http://schemas.openxmlformats.org/presentationml/2006/main">
+  <p:cSld>
+    <p:spTree>
+      <p:nvGrpSpPr>
+        <p:cNvPr id="1" name=""/>
+        <p:cNvGrpSpPr/>
+        <p:nvPr/>
+      </p:nvGrpSpPr>
+      <p:grpSpPr>
+        <a:xfrm>
+          <a:off x="0" y="0"/>
+          <a:ext cx="0" cy="0"/>
+          <a:chOff x="0" y="0"/>
+          <a:chExt cx="0" cy="0"/>
+        </a:xfrm>
+      </p:grpSpPr>
+      <p:sp>
+        <p:nvSpPr>
+          <p:cNvPr id="2" name="Slide Image Placeholder 1"/>
+          <p:cNvSpPr>
+            <a:spLocks noGrp="1" noRot="1" noChangeAspect="1"/>
+          </p:cNvSpPr>
+          <p:nvPr>
+            <p:ph type="sldImg"/>
+          </p:nvPr>
+        </p:nvSpPr>
+        <p:spPr/>
+      </p:sp>
+      <p:sp>
+        <p:nvSpPr>
+          <p:cNvPr id="3" name="Notes Placeholder 2"/>
+          <p:cNvSpPr>
+            <a:spLocks noGrp="1"/>
+          </p:cNvSpPr>
+          <p:nvPr>
+            <p:ph type="body" idx="1"/>
+          </p:nvPr>
+        </p:nvSpPr>
+        <p:spPr/>
+        <p:txBody>
+          <a:bodyPr/>
+          <a:lstStyle/>
+          <a:p>
+            <a:r>
+              <a:rPr lang="en-US" dirty="0"/>
+              <a:t>https://</a:t>
+            </a:r>
+            <a:r>
+              <a:rPr lang="en-US" dirty="0" err="1"/>
+              <a:t>developer.android.com</a:t>
+            </a:r>
+            <a:r>
+              <a:rPr lang="en-US" dirty="0"/>
+              <a:t>/training/material/</a:t>
+            </a:r>
+            <a:r>
+              <a:rPr lang="en-US" dirty="0" err="1"/>
+              <a:t>index.html</a:t>
+            </a:r>
+            <a:endParaRPr lang="en-US" dirty="0"/>
+          </a:p>
+        </p:txBody>
+      </p:sp>
+      <p:sp>
+        <p:nvSpPr>
+          <p:cNvPr id="4" name="Slide Number Placeholder 3"/>
+          <p:cNvSpPr>
+            <a:spLocks noGrp="1"/>
+          </p:cNvSpPr>
+          <p:nvPr>
+            <p:ph type="sldNum" sz="quarter" idx="10"/>
+          </p:nvPr>
+        </p:nvSpPr>
+        <p:spPr/>
+        <p:txBody>
+          <a:bodyPr/>
+          <a:lstStyle/>
+          <a:p>
+            <a:fld id="{44EB6C7D-DFD8-944D-93E3-D07F7EBDDEA8}" type="slidenum">
+              <a:rPr lang="en-US" smtClean="0"/>
+              <a:t>10</a:t>
+            </a:fld>
+            <a:endParaRPr lang="en-US"/>
+          </a:p>
+        </p:txBody>
+      </p:sp>
+    </p:spTree>
+    <p:extLst>
+      <p:ext uri="{BB962C8B-B14F-4D97-AF65-F5344CB8AC3E}">
+        <p14:creationId xmlns:p14="http://schemas.microsoft.com/office/powerpoint/2010/main" val="588937274"/>
+      </p:ext>
+    </p:extLst>
+  </p:cSld>
+  <p:clrMapOvr>
+    <a:masterClrMapping/>
+  </p:clrMapOvr>
+</p:notes>
+</file>
+
+<file path=ppt/notesSlides/notesSlide9.xml><?xml version="1.0" encoding="utf-8"?>
+<p:notes xmlns:a="http://schemas.openxmlformats.org/drawingml/2006/main" xmlns:r="http://schemas.openxmlformats.org/officeDocument/2006/relationships" xmlns:p="http://schemas.openxmlformats.org/presentationml/2006/main">
+  <p:cSld>
+    <p:spTree>
+      <p:nvGrpSpPr>
+        <p:cNvPr id="1" name=""/>
+        <p:cNvGrpSpPr/>
+        <p:nvPr/>
+      </p:nvGrpSpPr>
+      <p:grpSpPr>
+        <a:xfrm>
+          <a:off x="0" y="0"/>
+          <a:ext cx="0" cy="0"/>
+          <a:chOff x="0" y="0"/>
+          <a:chExt cx="0" cy="0"/>
+        </a:xfrm>
+      </p:grpSpPr>
+      <p:sp>
+        <p:nvSpPr>
+          <p:cNvPr id="2" name="Slide Image Placeholder 1"/>
+          <p:cNvSpPr>
+            <a:spLocks noGrp="1" noRot="1" noChangeAspect="1"/>
+          </p:cNvSpPr>
+          <p:nvPr>
+            <p:ph type="sldImg"/>
+          </p:nvPr>
+        </p:nvSpPr>
+        <p:spPr/>
+      </p:sp>
+      <p:sp>
+        <p:nvSpPr>
+          <p:cNvPr id="3" name="Notes Placeholder 2"/>
+          <p:cNvSpPr>
+            <a:spLocks noGrp="1"/>
+          </p:cNvSpPr>
+          <p:nvPr>
+            <p:ph type="body" idx="1"/>
+          </p:nvPr>
+        </p:nvSpPr>
+        <p:spPr/>
+        <p:txBody>
+          <a:bodyPr/>
+          <a:lstStyle/>
+          <a:p>
+            <a:r>
+              <a:rPr lang="en-US" dirty="0"/>
               <a:t>Reveal animations provide users visual continuity when you show or hide a group of UI elements. The </a:t>
             </a:r>
             <a:r>
@@ -857,7 +1349,7 @@
           <a:p>
             <a:fld id="{44EB6C7D-DFD8-944D-93E3-D07F7EBDDEA8}" type="slidenum">
               <a:rPr lang="en-US" smtClean="0"/>
-              <a:t>11</a:t>
+              <a:t>16</a:t>
             </a:fld>
             <a:endParaRPr lang="en-US"/>
           </a:p>
@@ -1055,7 +1547,7 @@
           <a:p>
             <a:fld id="{12110144-19AD-4D4E-902D-E18AF93089D3}" type="datetimeFigureOut">
               <a:rPr lang="en-US" smtClean="0"/>
-              <a:t>6/28/18</a:t>
+              <a:t>6/29/18</a:t>
             </a:fld>
             <a:endParaRPr lang="en-US"/>
           </a:p>
@@ -1223,7 +1715,7 @@
           <a:p>
             <a:fld id="{12110144-19AD-4D4E-902D-E18AF93089D3}" type="datetimeFigureOut">
               <a:rPr lang="en-US" smtClean="0"/>
-              <a:t>6/28/18</a:t>
+              <a:t>6/29/18</a:t>
             </a:fld>
             <a:endParaRPr lang="en-US"/>
           </a:p>
@@ -1401,7 +1893,7 @@
           <a:p>
             <a:fld id="{12110144-19AD-4D4E-902D-E18AF93089D3}" type="datetimeFigureOut">
               <a:rPr lang="en-US" smtClean="0"/>
-              <a:t>6/28/18</a:t>
+              <a:t>6/29/18</a:t>
             </a:fld>
             <a:endParaRPr lang="en-US"/>
           </a:p>
@@ -1569,7 +2061,7 @@
           <a:p>
             <a:fld id="{12110144-19AD-4D4E-902D-E18AF93089D3}" type="datetimeFigureOut">
               <a:rPr lang="en-US" smtClean="0"/>
-              <a:t>6/28/18</a:t>
+              <a:t>6/29/18</a:t>
             </a:fld>
             <a:endParaRPr lang="en-US"/>
           </a:p>
@@ -1814,7 +2306,7 @@
           <a:p>
             <a:fld id="{12110144-19AD-4D4E-902D-E18AF93089D3}" type="datetimeFigureOut">
               <a:rPr lang="en-US" smtClean="0"/>
-              <a:t>6/28/18</a:t>
+              <a:t>6/29/18</a:t>
             </a:fld>
             <a:endParaRPr lang="en-US"/>
           </a:p>
@@ -2099,7 +2591,7 @@
           <a:p>
             <a:fld id="{12110144-19AD-4D4E-902D-E18AF93089D3}" type="datetimeFigureOut">
               <a:rPr lang="en-US" smtClean="0"/>
-              <a:t>6/28/18</a:t>
+              <a:t>6/29/18</a:t>
             </a:fld>
             <a:endParaRPr lang="en-US"/>
           </a:p>
@@ -2518,7 +3010,7 @@
           <a:p>
             <a:fld id="{12110144-19AD-4D4E-902D-E18AF93089D3}" type="datetimeFigureOut">
               <a:rPr lang="en-US" smtClean="0"/>
-              <a:t>6/28/18</a:t>
+              <a:t>6/29/18</a:t>
             </a:fld>
             <a:endParaRPr lang="en-US"/>
           </a:p>
@@ -2635,7 +3127,7 @@
           <a:p>
             <a:fld id="{12110144-19AD-4D4E-902D-E18AF93089D3}" type="datetimeFigureOut">
               <a:rPr lang="en-US" smtClean="0"/>
-              <a:t>6/28/18</a:t>
+              <a:t>6/29/18</a:t>
             </a:fld>
             <a:endParaRPr lang="en-US"/>
           </a:p>
@@ -2730,7 +3222,7 @@
           <a:p>
             <a:fld id="{12110144-19AD-4D4E-902D-E18AF93089D3}" type="datetimeFigureOut">
               <a:rPr lang="en-US" smtClean="0"/>
-              <a:t>6/28/18</a:t>
+              <a:t>6/29/18</a:t>
             </a:fld>
             <a:endParaRPr lang="en-US"/>
           </a:p>
@@ -3005,7 +3497,7 @@
           <a:p>
             <a:fld id="{12110144-19AD-4D4E-902D-E18AF93089D3}" type="datetimeFigureOut">
               <a:rPr lang="en-US" smtClean="0"/>
-              <a:t>6/28/18</a:t>
+              <a:t>6/29/18</a:t>
             </a:fld>
             <a:endParaRPr lang="en-US"/>
           </a:p>
@@ -3257,7 +3749,7 @@
           <a:p>
             <a:fld id="{12110144-19AD-4D4E-902D-E18AF93089D3}" type="datetimeFigureOut">
               <a:rPr lang="en-US" smtClean="0"/>
-              <a:t>6/28/18</a:t>
+              <a:t>6/29/18</a:t>
             </a:fld>
             <a:endParaRPr lang="en-US"/>
           </a:p>
@@ -3486,7 +3978,7 @@
           <a:p>
             <a:fld id="{12110144-19AD-4D4E-902D-E18AF93089D3}" type="datetimeFigureOut">
               <a:rPr lang="en-US" smtClean="0"/>
-              <a:t>6/28/18</a:t>
+              <a:t>6/29/18</a:t>
             </a:fld>
             <a:endParaRPr lang="en-US"/>
           </a:p>
@@ -4008,6 +4500,612 @@
       </p:grpSpPr>
       <p:sp>
         <p:nvSpPr>
+          <p:cNvPr id="2" name="Title 1"/>
+          <p:cNvSpPr>
+            <a:spLocks noGrp="1"/>
+          </p:cNvSpPr>
+          <p:nvPr>
+            <p:ph type="title"/>
+          </p:nvPr>
+        </p:nvSpPr>
+        <p:spPr>
+          <a:xfrm>
+            <a:off x="457200" y="274638"/>
+            <a:ext cx="8229600" cy="876430"/>
+          </a:xfrm>
+        </p:spPr>
+        <p:txBody>
+          <a:bodyPr/>
+          <a:lstStyle/>
+          <a:p>
+            <a:r>
+              <a:rPr lang="en-US" dirty="0">
+                <a:solidFill>
+                  <a:srgbClr val="0208F2"/>
+                </a:solidFill>
+              </a:rPr>
+              <a:t>Material Design</a:t>
+            </a:r>
+          </a:p>
+        </p:txBody>
+      </p:sp>
+      <p:sp>
+        <p:nvSpPr>
+          <p:cNvPr id="3" name="Content Placeholder 2"/>
+          <p:cNvSpPr>
+            <a:spLocks noGrp="1"/>
+          </p:cNvSpPr>
+          <p:nvPr>
+            <p:ph idx="1"/>
+          </p:nvPr>
+        </p:nvSpPr>
+        <p:spPr>
+          <a:xfrm>
+            <a:off x="457200" y="1151068"/>
+            <a:ext cx="8229600" cy="4975095"/>
+          </a:xfrm>
+        </p:spPr>
+        <p:txBody>
+          <a:bodyPr>
+            <a:normAutofit fontScale="85000" lnSpcReduction="20000"/>
+          </a:bodyPr>
+          <a:lstStyle/>
+          <a:p>
+            <a:r>
+              <a:rPr lang="en-US" dirty="0"/>
+              <a:t>Material design is a comprehensive guide for visual, motion, and interaction. To use material design in your Android apps, follow the guidelines described in the material design specification and use the components and functionality available in Android 5.0, Lollipop (API level 21) and newer.</a:t>
+            </a:r>
+          </a:p>
+          <a:p>
+            <a:endParaRPr lang="en-US" dirty="0"/>
+          </a:p>
+          <a:p>
+            <a:r>
+              <a:rPr lang="en-US" dirty="0"/>
+              <a:t>Material design apps have the following elements:</a:t>
+            </a:r>
+          </a:p>
+          <a:p>
+            <a:pPr lvl="1"/>
+            <a:r>
+              <a:rPr lang="en-US" dirty="0"/>
+              <a:t>The material theme</a:t>
+            </a:r>
+          </a:p>
+          <a:p>
+            <a:pPr lvl="1"/>
+            <a:r>
+              <a:rPr lang="en-US" dirty="0"/>
+              <a:t>Widgets for cards and lists</a:t>
+            </a:r>
+          </a:p>
+          <a:p>
+            <a:pPr lvl="1"/>
+            <a:r>
+              <a:rPr lang="en-US" dirty="0"/>
+              <a:t>Custom shadows and view clipping</a:t>
+            </a:r>
+          </a:p>
+          <a:p>
+            <a:pPr lvl="1"/>
+            <a:r>
+              <a:rPr lang="en-US" dirty="0"/>
+              <a:t>Vector drawables</a:t>
+            </a:r>
+          </a:p>
+          <a:p>
+            <a:pPr lvl="1"/>
+            <a:r>
+              <a:rPr lang="en-US" dirty="0"/>
+              <a:t>Custom animations</a:t>
+            </a:r>
+          </a:p>
+          <a:p>
+            <a:endParaRPr lang="en-US" dirty="0"/>
+          </a:p>
+        </p:txBody>
+      </p:sp>
+    </p:spTree>
+    <p:extLst>
+      <p:ext uri="{BB962C8B-B14F-4D97-AF65-F5344CB8AC3E}">
+        <p14:creationId xmlns:p14="http://schemas.microsoft.com/office/powerpoint/2010/main" val="3709605184"/>
+      </p:ext>
+    </p:extLst>
+  </p:cSld>
+  <p:clrMapOvr>
+    <a:masterClrMapping/>
+  </p:clrMapOvr>
+</p:sld>
+</file>
+
+<file path=ppt/slides/slide11.xml><?xml version="1.0" encoding="utf-8"?>
+<p:sld xmlns:a="http://schemas.openxmlformats.org/drawingml/2006/main" xmlns:r="http://schemas.openxmlformats.org/officeDocument/2006/relationships" xmlns:p="http://schemas.openxmlformats.org/presentationml/2006/main">
+  <p:cSld>
+    <p:spTree>
+      <p:nvGrpSpPr>
+        <p:cNvPr id="1" name=""/>
+        <p:cNvGrpSpPr/>
+        <p:nvPr/>
+      </p:nvGrpSpPr>
+      <p:grpSpPr>
+        <a:xfrm>
+          <a:off x="0" y="0"/>
+          <a:ext cx="0" cy="0"/>
+          <a:chOff x="0" y="0"/>
+          <a:chExt cx="0" cy="0"/>
+        </a:xfrm>
+      </p:grpSpPr>
+      <p:sp>
+        <p:nvSpPr>
+          <p:cNvPr id="2" name="Title 1"/>
+          <p:cNvSpPr>
+            <a:spLocks noGrp="1"/>
+          </p:cNvSpPr>
+          <p:nvPr>
+            <p:ph type="title"/>
+          </p:nvPr>
+        </p:nvSpPr>
+        <p:spPr/>
+        <p:txBody>
+          <a:bodyPr/>
+          <a:lstStyle/>
+          <a:p>
+            <a:r>
+              <a:rPr lang="en-US" dirty="0"/>
+              <a:t>Material Theme</a:t>
+            </a:r>
+          </a:p>
+        </p:txBody>
+      </p:sp>
+      <p:sp>
+        <p:nvSpPr>
+          <p:cNvPr id="3" name="Content Placeholder 2"/>
+          <p:cNvSpPr>
+            <a:spLocks noGrp="1"/>
+          </p:cNvSpPr>
+          <p:nvPr>
+            <p:ph sz="half" idx="1"/>
+          </p:nvPr>
+        </p:nvSpPr>
+        <p:spPr/>
+        <p:txBody>
+          <a:bodyPr>
+            <a:normAutofit lnSpcReduction="10000"/>
+          </a:bodyPr>
+          <a:lstStyle/>
+          <a:p>
+            <a:pPr marL="0" indent="0">
+              <a:buNone/>
+            </a:pPr>
+            <a:r>
+              <a:rPr lang="en-US" dirty="0"/>
+              <a:t>The material theme provides:</a:t>
+            </a:r>
+          </a:p>
+          <a:p>
+            <a:r>
+              <a:rPr lang="en-US" dirty="0"/>
+              <a:t>System widgets that let you set their color palette</a:t>
+            </a:r>
+          </a:p>
+          <a:p>
+            <a:r>
+              <a:rPr lang="en-US" dirty="0"/>
+              <a:t>Touch feedback animations for the system widgets</a:t>
+            </a:r>
+          </a:p>
+          <a:p>
+            <a:r>
+              <a:rPr lang="en-US" dirty="0"/>
+              <a:t>Activity transition animations</a:t>
+            </a:r>
+          </a:p>
+        </p:txBody>
+      </p:sp>
+      <p:pic>
+        <p:nvPicPr>
+          <p:cNvPr id="12" name="Content Placeholder 11"/>
+          <p:cNvPicPr>
+            <a:picLocks noGrp="1" noChangeAspect="1"/>
+          </p:cNvPicPr>
+          <p:nvPr>
+            <p:ph sz="half" idx="2"/>
+          </p:nvPr>
+        </p:nvPicPr>
+        <p:blipFill>
+          <a:blip r:embed="rId2"/>
+          <a:srcRect l="7526" r="7526"/>
+          <a:stretch>
+            <a:fillRect/>
+          </a:stretch>
+        </p:blipFill>
+        <p:spPr/>
+      </p:pic>
+    </p:spTree>
+    <p:extLst>
+      <p:ext uri="{BB962C8B-B14F-4D97-AF65-F5344CB8AC3E}">
+        <p14:creationId xmlns:p14="http://schemas.microsoft.com/office/powerpoint/2010/main" val="1099750604"/>
+      </p:ext>
+    </p:extLst>
+  </p:cSld>
+  <p:clrMapOvr>
+    <a:masterClrMapping/>
+  </p:clrMapOvr>
+</p:sld>
+</file>
+
+<file path=ppt/slides/slide12.xml><?xml version="1.0" encoding="utf-8"?>
+<p:sld xmlns:a="http://schemas.openxmlformats.org/drawingml/2006/main" xmlns:r="http://schemas.openxmlformats.org/officeDocument/2006/relationships" xmlns:p="http://schemas.openxmlformats.org/presentationml/2006/main">
+  <p:cSld>
+    <p:spTree>
+      <p:nvGrpSpPr>
+        <p:cNvPr id="1" name=""/>
+        <p:cNvGrpSpPr/>
+        <p:nvPr/>
+      </p:nvGrpSpPr>
+      <p:grpSpPr>
+        <a:xfrm>
+          <a:off x="0" y="0"/>
+          <a:ext cx="0" cy="0"/>
+          <a:chOff x="0" y="0"/>
+          <a:chExt cx="0" cy="0"/>
+        </a:xfrm>
+      </p:grpSpPr>
+      <p:sp>
+        <p:nvSpPr>
+          <p:cNvPr id="8" name="Title 7"/>
+          <p:cNvSpPr>
+            <a:spLocks noGrp="1"/>
+          </p:cNvSpPr>
+          <p:nvPr>
+            <p:ph type="title"/>
+          </p:nvPr>
+        </p:nvSpPr>
+        <p:spPr/>
+        <p:txBody>
+          <a:bodyPr/>
+          <a:lstStyle/>
+          <a:p>
+            <a:r>
+              <a:rPr lang="en-US" dirty="0"/>
+              <a:t>New Type of List View</a:t>
+            </a:r>
+          </a:p>
+        </p:txBody>
+      </p:sp>
+      <p:sp>
+        <p:nvSpPr>
+          <p:cNvPr id="9" name="Content Placeholder 8"/>
+          <p:cNvSpPr>
+            <a:spLocks noGrp="1"/>
+          </p:cNvSpPr>
+          <p:nvPr>
+            <p:ph sz="half" idx="1"/>
+          </p:nvPr>
+        </p:nvSpPr>
+        <p:spPr/>
+        <p:txBody>
+          <a:bodyPr>
+            <a:normAutofit lnSpcReduction="10000"/>
+          </a:bodyPr>
+          <a:lstStyle/>
+          <a:p>
+            <a:pPr marL="0" indent="0">
+              <a:buNone/>
+            </a:pPr>
+            <a:r>
+              <a:rPr lang="en-US" dirty="0"/>
+              <a:t>The </a:t>
+            </a:r>
+            <a:r>
+              <a:rPr lang="en-US" dirty="0" err="1"/>
+              <a:t>RecyclerView</a:t>
+            </a:r>
+            <a:r>
+              <a:rPr lang="en-US" dirty="0"/>
+              <a:t> class simplifies the display and handling of large data sets by providing:</a:t>
+            </a:r>
+          </a:p>
+          <a:p>
+            <a:r>
+              <a:rPr lang="en-US" dirty="0"/>
+              <a:t>Layout managers for positioning items</a:t>
+            </a:r>
+          </a:p>
+          <a:p>
+            <a:r>
+              <a:rPr lang="en-US" dirty="0"/>
+              <a:t>Default animations for common item operations, such as removal or addition of items</a:t>
+            </a:r>
+          </a:p>
+        </p:txBody>
+      </p:sp>
+      <p:pic>
+        <p:nvPicPr>
+          <p:cNvPr id="11" name="Content Placeholder 10"/>
+          <p:cNvPicPr>
+            <a:picLocks noGrp="1" noChangeAspect="1"/>
+          </p:cNvPicPr>
+          <p:nvPr>
+            <p:ph sz="half" idx="2"/>
+          </p:nvPr>
+        </p:nvPicPr>
+        <p:blipFill rotWithShape="1">
+          <a:blip r:embed="rId2"/>
+          <a:srcRect t="12512" b="12512"/>
+          <a:stretch/>
+        </p:blipFill>
+        <p:spPr>
+          <a:xfrm>
+            <a:off x="4648200" y="1681962"/>
+            <a:ext cx="4038600" cy="4444201"/>
+          </a:xfrm>
+        </p:spPr>
+      </p:pic>
+    </p:spTree>
+    <p:extLst>
+      <p:ext uri="{BB962C8B-B14F-4D97-AF65-F5344CB8AC3E}">
+        <p14:creationId xmlns:p14="http://schemas.microsoft.com/office/powerpoint/2010/main" val="3861671194"/>
+      </p:ext>
+    </p:extLst>
+  </p:cSld>
+  <p:clrMapOvr>
+    <a:masterClrMapping/>
+  </p:clrMapOvr>
+</p:sld>
+</file>
+
+<file path=ppt/slides/slide13.xml><?xml version="1.0" encoding="utf-8"?>
+<p:sld xmlns:a="http://schemas.openxmlformats.org/drawingml/2006/main" xmlns:r="http://schemas.openxmlformats.org/officeDocument/2006/relationships" xmlns:p="http://schemas.openxmlformats.org/presentationml/2006/main">
+  <p:cSld>
+    <p:spTree>
+      <p:nvGrpSpPr>
+        <p:cNvPr id="1" name=""/>
+        <p:cNvGrpSpPr/>
+        <p:nvPr/>
+      </p:nvGrpSpPr>
+      <p:grpSpPr>
+        <a:xfrm>
+          <a:off x="0" y="0"/>
+          <a:ext cx="0" cy="0"/>
+          <a:chOff x="0" y="0"/>
+          <a:chExt cx="0" cy="0"/>
+        </a:xfrm>
+      </p:grpSpPr>
+      <p:sp>
+        <p:nvSpPr>
+          <p:cNvPr id="2" name="Title 1"/>
+          <p:cNvSpPr>
+            <a:spLocks noGrp="1"/>
+          </p:cNvSpPr>
+          <p:nvPr>
+            <p:ph type="title"/>
+          </p:nvPr>
+        </p:nvSpPr>
+        <p:spPr/>
+        <p:txBody>
+          <a:bodyPr/>
+          <a:lstStyle/>
+          <a:p>
+            <a:r>
+              <a:rPr lang="en-US" dirty="0"/>
+              <a:t>Cards</a:t>
+            </a:r>
+          </a:p>
+        </p:txBody>
+      </p:sp>
+      <p:sp>
+        <p:nvSpPr>
+          <p:cNvPr id="3" name="Content Placeholder 2"/>
+          <p:cNvSpPr>
+            <a:spLocks noGrp="1"/>
+          </p:cNvSpPr>
+          <p:nvPr>
+            <p:ph sz="half" idx="1"/>
+          </p:nvPr>
+        </p:nvSpPr>
+        <p:spPr/>
+        <p:txBody>
+          <a:bodyPr/>
+          <a:lstStyle/>
+          <a:p>
+            <a:pPr marL="0" indent="0">
+              <a:buNone/>
+            </a:pPr>
+            <a:r>
+              <a:rPr lang="en-US" dirty="0" err="1"/>
+              <a:t>CardView</a:t>
+            </a:r>
+            <a:r>
+              <a:rPr lang="en-US" dirty="0"/>
+              <a:t> extends the </a:t>
+            </a:r>
+            <a:r>
+              <a:rPr lang="en-US" dirty="0" err="1"/>
+              <a:t>FrameLayout</a:t>
+            </a:r>
+            <a:r>
+              <a:rPr lang="en-US" dirty="0"/>
+              <a:t> class and lets you show information inside cards that have a consistent look across the platform. </a:t>
+            </a:r>
+            <a:r>
+              <a:rPr lang="en-US" dirty="0" err="1"/>
+              <a:t>CardView</a:t>
+            </a:r>
+            <a:r>
+              <a:rPr lang="en-US" dirty="0"/>
+              <a:t> widgets can have shadows and rounded corners.</a:t>
+            </a:r>
+          </a:p>
+        </p:txBody>
+      </p:sp>
+      <p:pic>
+        <p:nvPicPr>
+          <p:cNvPr id="5" name="Content Placeholder 4"/>
+          <p:cNvPicPr>
+            <a:picLocks noGrp="1" noChangeAspect="1"/>
+          </p:cNvPicPr>
+          <p:nvPr>
+            <p:ph sz="half" idx="2"/>
+          </p:nvPr>
+        </p:nvPicPr>
+        <p:blipFill>
+          <a:blip r:embed="rId2"/>
+          <a:srcRect l="-26115" r="-26115"/>
+          <a:stretch>
+            <a:fillRect/>
+          </a:stretch>
+        </p:blipFill>
+        <p:spPr>
+          <a:xfrm>
+            <a:off x="4261716" y="1167076"/>
+            <a:ext cx="4808831" cy="5389143"/>
+          </a:xfrm>
+        </p:spPr>
+      </p:pic>
+    </p:spTree>
+    <p:extLst>
+      <p:ext uri="{BB962C8B-B14F-4D97-AF65-F5344CB8AC3E}">
+        <p14:creationId xmlns:p14="http://schemas.microsoft.com/office/powerpoint/2010/main" val="4179464225"/>
+      </p:ext>
+    </p:extLst>
+  </p:cSld>
+  <p:clrMapOvr>
+    <a:masterClrMapping/>
+  </p:clrMapOvr>
+</p:sld>
+</file>
+
+<file path=ppt/slides/slide14.xml><?xml version="1.0" encoding="utf-8"?>
+<p:sld xmlns:a="http://schemas.openxmlformats.org/drawingml/2006/main" xmlns:r="http://schemas.openxmlformats.org/officeDocument/2006/relationships" xmlns:p="http://schemas.openxmlformats.org/presentationml/2006/main">
+  <p:cSld>
+    <p:spTree>
+      <p:nvGrpSpPr>
+        <p:cNvPr id="1" name=""/>
+        <p:cNvGrpSpPr/>
+        <p:nvPr/>
+      </p:nvGrpSpPr>
+      <p:grpSpPr>
+        <a:xfrm>
+          <a:off x="0" y="0"/>
+          <a:ext cx="0" cy="0"/>
+          <a:chOff x="0" y="0"/>
+          <a:chExt cx="0" cy="0"/>
+        </a:xfrm>
+      </p:grpSpPr>
+      <p:sp>
+        <p:nvSpPr>
+          <p:cNvPr id="5" name="Title 4"/>
+          <p:cNvSpPr>
+            <a:spLocks noGrp="1"/>
+          </p:cNvSpPr>
+          <p:nvPr>
+            <p:ph type="title"/>
+          </p:nvPr>
+        </p:nvSpPr>
+        <p:spPr/>
+        <p:txBody>
+          <a:bodyPr/>
+          <a:lstStyle/>
+          <a:p>
+            <a:r>
+              <a:rPr lang="en-US" dirty="0"/>
+              <a:t>Elevation: Shadows and Movement</a:t>
+            </a:r>
+          </a:p>
+        </p:txBody>
+      </p:sp>
+      <p:sp>
+        <p:nvSpPr>
+          <p:cNvPr id="6" name="Content Placeholder 5"/>
+          <p:cNvSpPr>
+            <a:spLocks noGrp="1"/>
+          </p:cNvSpPr>
+          <p:nvPr>
+            <p:ph idx="1"/>
+          </p:nvPr>
+        </p:nvSpPr>
+        <p:spPr/>
+        <p:txBody>
+          <a:bodyPr>
+            <a:normAutofit fontScale="85000" lnSpcReduction="10000"/>
+          </a:bodyPr>
+          <a:lstStyle/>
+          <a:p>
+            <a:pPr marL="0" indent="0">
+              <a:buNone/>
+            </a:pPr>
+            <a:r>
+              <a:rPr lang="en-US" dirty="0"/>
+              <a:t>Material design introduces elevation for UI elements. </a:t>
+            </a:r>
+          </a:p>
+          <a:p>
+            <a:r>
+              <a:rPr lang="en-US" dirty="0"/>
+              <a:t>Elevation helps users understand the relative importance of each element</a:t>
+            </a:r>
+          </a:p>
+          <a:p>
+            <a:r>
+              <a:rPr lang="en-US" dirty="0"/>
+              <a:t>The elevation of a view, represented by the Z property, determines the visual appearance of its shadow</a:t>
+            </a:r>
+          </a:p>
+          <a:p>
+            <a:pPr lvl="1"/>
+            <a:r>
+              <a:rPr lang="en-US" dirty="0"/>
+              <a:t>Views with higher Z values cast larger, softer shadows</a:t>
+            </a:r>
+          </a:p>
+          <a:p>
+            <a:pPr lvl="1"/>
+            <a:r>
+              <a:rPr lang="en-US" dirty="0"/>
+              <a:t>Views with higher Z values occlude views with lower Z values</a:t>
+            </a:r>
+          </a:p>
+          <a:p>
+            <a:r>
+              <a:rPr lang="en-US" dirty="0"/>
+              <a:t>Elevation can be used to create animations where widgets temporarily rise above the view plane when performing some action.</a:t>
+            </a:r>
+          </a:p>
+        </p:txBody>
+      </p:sp>
+    </p:spTree>
+    <p:extLst>
+      <p:ext uri="{BB962C8B-B14F-4D97-AF65-F5344CB8AC3E}">
+        <p14:creationId xmlns:p14="http://schemas.microsoft.com/office/powerpoint/2010/main" val="3196178850"/>
+      </p:ext>
+    </p:extLst>
+  </p:cSld>
+  <p:clrMapOvr>
+    <a:masterClrMapping/>
+  </p:clrMapOvr>
+</p:sld>
+</file>
+
+<file path=ppt/slides/slide15.xml><?xml version="1.0" encoding="utf-8"?>
+<p:sld xmlns:a="http://schemas.openxmlformats.org/drawingml/2006/main" xmlns:r="http://schemas.openxmlformats.org/officeDocument/2006/relationships" xmlns:p="http://schemas.openxmlformats.org/presentationml/2006/main">
+  <p:cSld>
+    <p:spTree>
+      <p:nvGrpSpPr>
+        <p:cNvPr id="1" name=""/>
+        <p:cNvGrpSpPr/>
+        <p:nvPr/>
+      </p:nvGrpSpPr>
+      <p:grpSpPr>
+        <a:xfrm>
+          <a:off x="0" y="0"/>
+          <a:ext cx="0" cy="0"/>
+          <a:chOff x="0" y="0"/>
+          <a:chExt cx="0" cy="0"/>
+        </a:xfrm>
+      </p:grpSpPr>
+      <p:sp>
+        <p:nvSpPr>
           <p:cNvPr id="4" name="Title 3"/>
           <p:cNvSpPr>
             <a:spLocks noGrp="1"/>
@@ -4065,7 +5163,7 @@
 </p:sld>
 </file>
 
-<file path=ppt/slides/slide11.xml><?xml version="1.0" encoding="utf-8"?>
+<file path=ppt/slides/slide16.xml><?xml version="1.0" encoding="utf-8"?>
 <p:sld xmlns:a="http://schemas.openxmlformats.org/drawingml/2006/main" xmlns:r="http://schemas.openxmlformats.org/officeDocument/2006/relationships" xmlns:p="http://schemas.openxmlformats.org/presentationml/2006/main">
   <p:cSld>
     <p:spTree>
@@ -4180,7 +5278,7 @@
 </p:sld>
 </file>
 
-<file path=ppt/slides/slide12.xml><?xml version="1.0" encoding="utf-8"?>
+<file path=ppt/slides/slide17.xml><?xml version="1.0" encoding="utf-8"?>
 <p:sld xmlns:a="http://schemas.openxmlformats.org/drawingml/2006/main" xmlns:r="http://schemas.openxmlformats.org/officeDocument/2006/relationships" xmlns:p="http://schemas.openxmlformats.org/presentationml/2006/main">
   <p:cSld>
     <p:spTree>
@@ -5294,6 +6392,1087 @@
       </p:grpSpPr>
       <p:sp>
         <p:nvSpPr>
+          <p:cNvPr id="5" name="Title 4"/>
+          <p:cNvSpPr>
+            <a:spLocks noGrp="1"/>
+          </p:cNvSpPr>
+          <p:nvPr>
+            <p:ph type="title"/>
+          </p:nvPr>
+        </p:nvSpPr>
+        <p:spPr>
+          <a:xfrm>
+            <a:off x="457200" y="274638"/>
+            <a:ext cx="8229600" cy="962491"/>
+          </a:xfrm>
+        </p:spPr>
+        <p:txBody>
+          <a:bodyPr/>
+          <a:lstStyle/>
+          <a:p>
+            <a:r>
+              <a:rPr lang="en-US" dirty="0">
+                <a:solidFill>
+                  <a:srgbClr val="0208F2"/>
+                </a:solidFill>
+              </a:rPr>
+              <a:t>Create a Style</a:t>
+            </a:r>
+          </a:p>
+        </p:txBody>
+      </p:sp>
+      <p:sp>
+        <p:nvSpPr>
+          <p:cNvPr id="6" name="Content Placeholder 5"/>
+          <p:cNvSpPr>
+            <a:spLocks noGrp="1"/>
+          </p:cNvSpPr>
+          <p:nvPr>
+            <p:ph idx="1"/>
+          </p:nvPr>
+        </p:nvSpPr>
+        <p:spPr>
+          <a:xfrm>
+            <a:off x="457200" y="1237129"/>
+            <a:ext cx="8229600" cy="4861414"/>
+          </a:xfrm>
+        </p:spPr>
+        <p:txBody>
+          <a:bodyPr>
+            <a:normAutofit fontScale="85000" lnSpcReduction="20000"/>
+          </a:bodyPr>
+          <a:lstStyle/>
+          <a:p>
+            <a:r>
+              <a:rPr lang="en-US" dirty="0"/>
+              <a:t>Open your project's res/values/</a:t>
+            </a:r>
+            <a:r>
+              <a:rPr lang="en-US" dirty="0" err="1"/>
+              <a:t>styles.xml</a:t>
+            </a:r>
+            <a:r>
+              <a:rPr lang="en-US" dirty="0"/>
+              <a:t> file. </a:t>
+            </a:r>
+          </a:p>
+          <a:p>
+            <a:r>
+              <a:rPr lang="en-US" dirty="0"/>
+              <a:t>Add a &lt;style&gt; element with a name that uniquely identifies the style.</a:t>
+            </a:r>
+          </a:p>
+          <a:p>
+            <a:r>
+              <a:rPr lang="en-US" dirty="0"/>
+              <a:t>Add an &lt;item&gt; element for each style attribute you want to define. For example, if you define the following style:</a:t>
+            </a:r>
+          </a:p>
+          <a:p>
+            <a:pPr marL="0" indent="0">
+              <a:buNone/>
+            </a:pPr>
+            <a:r>
+              <a:rPr lang="en-US" sz="2800" dirty="0"/>
+              <a:t>&lt;?xml version=</a:t>
+            </a:r>
+            <a:r>
+              <a:rPr lang="en-US" dirty="0"/>
+              <a:t>"1.0"</a:t>
+            </a:r>
+            <a:r>
+              <a:rPr lang="en-US" sz="2800" dirty="0"/>
+              <a:t> encoding=</a:t>
+            </a:r>
+            <a:r>
+              <a:rPr lang="en-US" dirty="0"/>
+              <a:t>"utf-8"</a:t>
+            </a:r>
+            <a:r>
+              <a:rPr lang="en-US" sz="2800" dirty="0"/>
+              <a:t>?&gt;</a:t>
+            </a:r>
+            <a:br>
+              <a:rPr lang="en-US" sz="2800" dirty="0"/>
+            </a:br>
+            <a:r>
+              <a:rPr lang="en-US" dirty="0"/>
+              <a:t>&lt;resources&gt;</a:t>
+            </a:r>
+            <a:br>
+              <a:rPr lang="en-US" sz="2800" dirty="0"/>
+            </a:br>
+            <a:r>
+              <a:rPr lang="en-US" sz="2800" dirty="0"/>
+              <a:t>    </a:t>
+            </a:r>
+            <a:r>
+              <a:rPr lang="en-US" dirty="0"/>
+              <a:t>&lt;style</a:t>
+            </a:r>
+            <a:r>
+              <a:rPr lang="en-US" sz="2800" dirty="0"/>
+              <a:t> </a:t>
+            </a:r>
+            <a:r>
+              <a:rPr lang="en-US" dirty="0"/>
+              <a:t>name</a:t>
+            </a:r>
+            <a:r>
+              <a:rPr lang="en-US" sz="2800" dirty="0"/>
+              <a:t>=</a:t>
+            </a:r>
+            <a:r>
+              <a:rPr lang="en-US" dirty="0"/>
+              <a:t>"</a:t>
+            </a:r>
+            <a:r>
+              <a:rPr lang="en-US" dirty="0" err="1"/>
+              <a:t>GreenText</a:t>
+            </a:r>
+            <a:r>
+              <a:rPr lang="en-US" dirty="0"/>
+              <a:t>"</a:t>
+            </a:r>
+            <a:r>
+              <a:rPr lang="en-US" sz="2800" dirty="0"/>
+              <a:t> </a:t>
+            </a:r>
+            <a:r>
+              <a:rPr lang="en-US" dirty="0"/>
+              <a:t>parent</a:t>
+            </a:r>
+            <a:r>
+              <a:rPr lang="en-US" sz="2800" dirty="0"/>
+              <a:t>=</a:t>
+            </a:r>
+            <a:r>
+              <a:rPr lang="en-US" dirty="0"/>
+              <a:t>"</a:t>
+            </a:r>
+            <a:r>
+              <a:rPr lang="en-US" dirty="0" err="1"/>
+              <a:t>TextAppearance.AppCompat</a:t>
+            </a:r>
+            <a:r>
+              <a:rPr lang="en-US" dirty="0"/>
+              <a:t>"&gt;</a:t>
+            </a:r>
+            <a:br>
+              <a:rPr lang="en-US" sz="2800" dirty="0"/>
+            </a:br>
+            <a:r>
+              <a:rPr lang="en-US" sz="2800" dirty="0"/>
+              <a:t>        &lt;item name=</a:t>
+            </a:r>
+            <a:r>
+              <a:rPr lang="en-US" dirty="0"/>
+              <a:t>"</a:t>
+            </a:r>
+            <a:r>
+              <a:rPr lang="en-US" dirty="0" err="1"/>
+              <a:t>android:textColor</a:t>
+            </a:r>
+            <a:r>
+              <a:rPr lang="en-US" dirty="0"/>
+              <a:t>"</a:t>
+            </a:r>
+            <a:r>
+              <a:rPr lang="en-US" sz="2800" dirty="0"/>
+              <a:t>&gt;#</a:t>
+            </a:r>
+            <a:r>
+              <a:rPr lang="en-US" dirty="0"/>
+              <a:t>00FF00</a:t>
+            </a:r>
+            <a:r>
+              <a:rPr lang="en-US" sz="2800" dirty="0"/>
+              <a:t>&lt;/item&gt;</a:t>
+            </a:r>
+            <a:br>
+              <a:rPr lang="en-US" sz="2800" dirty="0"/>
+            </a:br>
+            <a:r>
+              <a:rPr lang="en-US" sz="2800" dirty="0"/>
+              <a:t>    </a:t>
+            </a:r>
+            <a:r>
+              <a:rPr lang="en-US" dirty="0"/>
+              <a:t>&lt;/style&gt;</a:t>
+            </a:r>
+            <a:br>
+              <a:rPr lang="en-US" sz="2800" dirty="0"/>
+            </a:br>
+            <a:r>
+              <a:rPr lang="en-US" dirty="0"/>
+              <a:t>&lt;/resources&gt;</a:t>
+            </a:r>
+            <a:endParaRPr lang="en-US" sz="2600" dirty="0"/>
+          </a:p>
+        </p:txBody>
+      </p:sp>
+    </p:spTree>
+    <p:extLst>
+      <p:ext uri="{BB962C8B-B14F-4D97-AF65-F5344CB8AC3E}">
+        <p14:creationId xmlns:p14="http://schemas.microsoft.com/office/powerpoint/2010/main" val="3903267341"/>
+      </p:ext>
+    </p:extLst>
+  </p:cSld>
+  <p:clrMapOvr>
+    <a:masterClrMapping/>
+  </p:clrMapOvr>
+</p:sld>
+</file>
+
+<file path=ppt/slides/slide5.xml><?xml version="1.0" encoding="utf-8"?>
+<p:sld xmlns:a="http://schemas.openxmlformats.org/drawingml/2006/main" xmlns:r="http://schemas.openxmlformats.org/officeDocument/2006/relationships" xmlns:p="http://schemas.openxmlformats.org/presentationml/2006/main">
+  <p:cSld>
+    <p:spTree>
+      <p:nvGrpSpPr>
+        <p:cNvPr id="1" name=""/>
+        <p:cNvGrpSpPr/>
+        <p:nvPr/>
+      </p:nvGrpSpPr>
+      <p:grpSpPr>
+        <a:xfrm>
+          <a:off x="0" y="0"/>
+          <a:ext cx="0" cy="0"/>
+          <a:chOff x="0" y="0"/>
+          <a:chExt cx="0" cy="0"/>
+        </a:xfrm>
+      </p:grpSpPr>
+      <p:sp>
+        <p:nvSpPr>
+          <p:cNvPr id="5" name="Title 4"/>
+          <p:cNvSpPr>
+            <a:spLocks noGrp="1"/>
+          </p:cNvSpPr>
+          <p:nvPr>
+            <p:ph type="title"/>
+          </p:nvPr>
+        </p:nvSpPr>
+        <p:spPr>
+          <a:xfrm>
+            <a:off x="457200" y="274638"/>
+            <a:ext cx="8229600" cy="962491"/>
+          </a:xfrm>
+        </p:spPr>
+        <p:txBody>
+          <a:bodyPr/>
+          <a:lstStyle/>
+          <a:p>
+            <a:r>
+              <a:rPr lang="en-US" dirty="0">
+                <a:solidFill>
+                  <a:srgbClr val="0208F2"/>
+                </a:solidFill>
+              </a:rPr>
+              <a:t>Use a Style</a:t>
+            </a:r>
+          </a:p>
+        </p:txBody>
+      </p:sp>
+      <p:sp>
+        <p:nvSpPr>
+          <p:cNvPr id="6" name="Content Placeholder 5"/>
+          <p:cNvSpPr>
+            <a:spLocks noGrp="1"/>
+          </p:cNvSpPr>
+          <p:nvPr>
+            <p:ph idx="1"/>
+          </p:nvPr>
+        </p:nvSpPr>
+        <p:spPr>
+          <a:xfrm>
+            <a:off x="457200" y="1237129"/>
+            <a:ext cx="8229600" cy="4861414"/>
+          </a:xfrm>
+        </p:spPr>
+        <p:txBody>
+          <a:bodyPr>
+            <a:normAutofit/>
+          </a:bodyPr>
+          <a:lstStyle/>
+          <a:p>
+            <a:r>
+              <a:rPr lang="en-US" dirty="0"/>
+              <a:t>You can apply the style to a view as follows:</a:t>
+            </a:r>
+          </a:p>
+          <a:p>
+            <a:pPr marL="0" indent="0">
+              <a:buNone/>
+            </a:pPr>
+            <a:r>
+              <a:rPr lang="en-US" dirty="0"/>
+              <a:t>&lt;</a:t>
+            </a:r>
+            <a:r>
+              <a:rPr lang="en-US" dirty="0" err="1"/>
+              <a:t>TextView</a:t>
+            </a:r>
+            <a:br>
+              <a:rPr lang="en-US" sz="2800" dirty="0"/>
+            </a:br>
+            <a:r>
+              <a:rPr lang="en-US" sz="2800" dirty="0"/>
+              <a:t>    </a:t>
+            </a:r>
+            <a:r>
+              <a:rPr lang="en-US" dirty="0"/>
+              <a:t>style</a:t>
+            </a:r>
+            <a:r>
+              <a:rPr lang="en-US" sz="2800" dirty="0"/>
+              <a:t>=</a:t>
+            </a:r>
+            <a:r>
+              <a:rPr lang="en-US" dirty="0"/>
+              <a:t>"</a:t>
+            </a:r>
+            <a:r>
+              <a:rPr lang="en-US" sz="2800" dirty="0"/>
+              <a:t>@style/</a:t>
+            </a:r>
+            <a:r>
+              <a:rPr lang="en-US" sz="2800" dirty="0" err="1"/>
+              <a:t>GreenText</a:t>
+            </a:r>
+            <a:r>
+              <a:rPr lang="en-US" dirty="0"/>
+              <a:t>"</a:t>
+            </a:r>
+            <a:br>
+              <a:rPr lang="en-US" sz="2800" dirty="0"/>
+            </a:br>
+            <a:r>
+              <a:rPr lang="en-US" sz="2800" dirty="0"/>
+              <a:t>    ... </a:t>
+            </a:r>
+            <a:r>
+              <a:rPr lang="en-US" dirty="0"/>
+              <a:t>/&gt;</a:t>
+            </a:r>
+            <a:br>
+              <a:rPr lang="en-US" sz="2800" dirty="0"/>
+            </a:br>
+            <a:endParaRPr lang="en-US" sz="2600" dirty="0"/>
+          </a:p>
+        </p:txBody>
+      </p:sp>
+    </p:spTree>
+    <p:extLst>
+      <p:ext uri="{BB962C8B-B14F-4D97-AF65-F5344CB8AC3E}">
+        <p14:creationId xmlns:p14="http://schemas.microsoft.com/office/powerpoint/2010/main" val="3803188103"/>
+      </p:ext>
+    </p:extLst>
+  </p:cSld>
+  <p:clrMapOvr>
+    <a:masterClrMapping/>
+  </p:clrMapOvr>
+</p:sld>
+</file>
+
+<file path=ppt/slides/slide6.xml><?xml version="1.0" encoding="utf-8"?>
+<p:sld xmlns:a="http://schemas.openxmlformats.org/drawingml/2006/main" xmlns:r="http://schemas.openxmlformats.org/officeDocument/2006/relationships" xmlns:p="http://schemas.openxmlformats.org/presentationml/2006/main">
+  <p:cSld>
+    <p:spTree>
+      <p:nvGrpSpPr>
+        <p:cNvPr id="1" name=""/>
+        <p:cNvGrpSpPr/>
+        <p:nvPr/>
+      </p:nvGrpSpPr>
+      <p:grpSpPr>
+        <a:xfrm>
+          <a:off x="0" y="0"/>
+          <a:ext cx="0" cy="0"/>
+          <a:chOff x="0" y="0"/>
+          <a:chExt cx="0" cy="0"/>
+        </a:xfrm>
+      </p:grpSpPr>
+      <p:sp>
+        <p:nvSpPr>
+          <p:cNvPr id="5" name="Title 4"/>
+          <p:cNvSpPr>
+            <a:spLocks noGrp="1"/>
+          </p:cNvSpPr>
+          <p:nvPr>
+            <p:ph type="title"/>
+          </p:nvPr>
+        </p:nvSpPr>
+        <p:spPr>
+          <a:xfrm>
+            <a:off x="457200" y="274638"/>
+            <a:ext cx="8229600" cy="962491"/>
+          </a:xfrm>
+        </p:spPr>
+        <p:txBody>
+          <a:bodyPr/>
+          <a:lstStyle/>
+          <a:p>
+            <a:r>
+              <a:rPr lang="en-US" dirty="0">
+                <a:solidFill>
+                  <a:srgbClr val="0208F2"/>
+                </a:solidFill>
+              </a:rPr>
+              <a:t>Apply a Theme</a:t>
+            </a:r>
+          </a:p>
+        </p:txBody>
+      </p:sp>
+      <p:sp>
+        <p:nvSpPr>
+          <p:cNvPr id="6" name="Content Placeholder 5"/>
+          <p:cNvSpPr>
+            <a:spLocks noGrp="1"/>
+          </p:cNvSpPr>
+          <p:nvPr>
+            <p:ph idx="1"/>
+          </p:nvPr>
+        </p:nvSpPr>
+        <p:spPr>
+          <a:xfrm>
+            <a:off x="457200" y="1237129"/>
+            <a:ext cx="8229600" cy="4861414"/>
+          </a:xfrm>
+        </p:spPr>
+        <p:txBody>
+          <a:bodyPr>
+            <a:normAutofit fontScale="77500" lnSpcReduction="20000"/>
+          </a:bodyPr>
+          <a:lstStyle/>
+          <a:p>
+            <a:r>
+              <a:rPr lang="en-US" dirty="0"/>
+              <a:t>Apply a theme to the whole app:</a:t>
+            </a:r>
+          </a:p>
+          <a:p>
+            <a:pPr marL="0" indent="0">
+              <a:buNone/>
+            </a:pPr>
+            <a:r>
+              <a:rPr lang="en-US" dirty="0"/>
+              <a:t>&lt;manifest</a:t>
+            </a:r>
+            <a:r>
+              <a:rPr lang="en-US" sz="2800" dirty="0"/>
+              <a:t> ... </a:t>
+            </a:r>
+            <a:r>
+              <a:rPr lang="en-US" dirty="0"/>
+              <a:t>&gt;</a:t>
+            </a:r>
+            <a:br>
+              <a:rPr lang="en-US" sz="2800" dirty="0"/>
+            </a:br>
+            <a:r>
+              <a:rPr lang="en-US" sz="2800" dirty="0"/>
+              <a:t>    </a:t>
+            </a:r>
+            <a:r>
+              <a:rPr lang="en-US" dirty="0"/>
+              <a:t>&lt;application</a:t>
+            </a:r>
+            <a:r>
+              <a:rPr lang="en-US" sz="2800" dirty="0"/>
+              <a:t> </a:t>
+            </a:r>
+            <a:r>
+              <a:rPr lang="en-US" dirty="0" err="1"/>
+              <a:t>android:theme</a:t>
+            </a:r>
+            <a:r>
+              <a:rPr lang="en-US" sz="2800" dirty="0"/>
+              <a:t>=</a:t>
+            </a:r>
+            <a:r>
+              <a:rPr lang="en-US" dirty="0"/>
+              <a:t>"@style/</a:t>
+            </a:r>
+            <a:r>
+              <a:rPr lang="en-US" dirty="0" err="1"/>
+              <a:t>Theme.AppCompat</a:t>
+            </a:r>
+            <a:r>
+              <a:rPr lang="en-US" dirty="0"/>
+              <a:t>"</a:t>
+            </a:r>
+            <a:r>
+              <a:rPr lang="en-US" sz="2800" dirty="0"/>
+              <a:t> ... </a:t>
+            </a:r>
+            <a:r>
+              <a:rPr lang="en-US" dirty="0"/>
+              <a:t>&gt;</a:t>
+            </a:r>
+            <a:br>
+              <a:rPr lang="en-US" sz="2800" dirty="0"/>
+            </a:br>
+            <a:r>
+              <a:rPr lang="en-US" sz="2800" dirty="0"/>
+              <a:t>    </a:t>
+            </a:r>
+            <a:r>
+              <a:rPr lang="en-US" dirty="0"/>
+              <a:t>&lt;/application&gt;</a:t>
+            </a:r>
+            <a:br>
+              <a:rPr lang="en-US" sz="2800" dirty="0"/>
+            </a:br>
+            <a:r>
+              <a:rPr lang="en-US" dirty="0"/>
+              <a:t>&lt;/manifest&gt;</a:t>
+            </a:r>
+          </a:p>
+          <a:p>
+            <a:r>
+              <a:rPr lang="en-US" dirty="0"/>
+              <a:t>Apply a theme to just one activity:</a:t>
+            </a:r>
+          </a:p>
+          <a:p>
+            <a:pPr marL="0" indent="0">
+              <a:buNone/>
+            </a:pPr>
+            <a:r>
+              <a:rPr lang="en-US" dirty="0"/>
+              <a:t>&lt;manifest</a:t>
+            </a:r>
+            <a:r>
+              <a:rPr lang="en-US" sz="2800" dirty="0"/>
+              <a:t> ... </a:t>
+            </a:r>
+            <a:r>
+              <a:rPr lang="en-US" dirty="0"/>
+              <a:t>&gt;</a:t>
+            </a:r>
+            <a:br>
+              <a:rPr lang="en-US" sz="2800" dirty="0"/>
+            </a:br>
+            <a:r>
+              <a:rPr lang="en-US" sz="2800" dirty="0"/>
+              <a:t>    </a:t>
+            </a:r>
+            <a:r>
+              <a:rPr lang="en-US" dirty="0"/>
+              <a:t>&lt;application</a:t>
+            </a:r>
+            <a:r>
+              <a:rPr lang="en-US" sz="2800" dirty="0"/>
+              <a:t> ... </a:t>
+            </a:r>
+            <a:r>
+              <a:rPr lang="en-US" dirty="0"/>
+              <a:t>&gt;</a:t>
+            </a:r>
+            <a:br>
+              <a:rPr lang="en-US" sz="2800" dirty="0"/>
+            </a:br>
+            <a:r>
+              <a:rPr lang="en-US" sz="2800" dirty="0"/>
+              <a:t>        </a:t>
+            </a:r>
+            <a:r>
+              <a:rPr lang="en-US" dirty="0"/>
+              <a:t>&lt;activity</a:t>
+            </a:r>
+            <a:r>
+              <a:rPr lang="en-US" sz="2800" dirty="0"/>
+              <a:t> </a:t>
+            </a:r>
+            <a:r>
+              <a:rPr lang="en-US" dirty="0" err="1"/>
+              <a:t>android:theme</a:t>
+            </a:r>
+            <a:r>
+              <a:rPr lang="en-US" sz="2800" dirty="0"/>
+              <a:t>=</a:t>
+            </a:r>
+            <a:r>
+              <a:rPr lang="en-US" dirty="0"/>
+              <a:t>"@style/</a:t>
+            </a:r>
+            <a:r>
+              <a:rPr lang="en-US" dirty="0" err="1"/>
+              <a:t>Theme.AppCompat.Light</a:t>
+            </a:r>
+            <a:r>
+              <a:rPr lang="en-US" dirty="0"/>
+              <a:t>"</a:t>
+            </a:r>
+            <a:r>
+              <a:rPr lang="en-US" sz="2800" dirty="0"/>
+              <a:t> ... </a:t>
+            </a:r>
+            <a:r>
+              <a:rPr lang="en-US" dirty="0"/>
+              <a:t>&gt;</a:t>
+            </a:r>
+            <a:br>
+              <a:rPr lang="en-US" sz="2800" dirty="0"/>
+            </a:br>
+            <a:r>
+              <a:rPr lang="en-US" sz="2800" dirty="0"/>
+              <a:t>        </a:t>
+            </a:r>
+            <a:r>
+              <a:rPr lang="en-US" dirty="0"/>
+              <a:t>&lt;/activity&gt;</a:t>
+            </a:r>
+            <a:br>
+              <a:rPr lang="en-US" sz="2800" dirty="0"/>
+            </a:br>
+            <a:r>
+              <a:rPr lang="en-US" sz="2800" dirty="0"/>
+              <a:t>    </a:t>
+            </a:r>
+            <a:r>
+              <a:rPr lang="en-US" dirty="0"/>
+              <a:t>&lt;/application&gt;</a:t>
+            </a:r>
+            <a:br>
+              <a:rPr lang="en-US" sz="2800" dirty="0"/>
+            </a:br>
+            <a:r>
+              <a:rPr lang="en-US" dirty="0"/>
+              <a:t>&lt;/manifest&gt;</a:t>
+            </a:r>
+            <a:br>
+              <a:rPr lang="en-US" sz="2800" dirty="0"/>
+            </a:br>
+            <a:endParaRPr lang="en-US" sz="2600" dirty="0"/>
+          </a:p>
+        </p:txBody>
+      </p:sp>
+    </p:spTree>
+    <p:extLst>
+      <p:ext uri="{BB962C8B-B14F-4D97-AF65-F5344CB8AC3E}">
+        <p14:creationId xmlns:p14="http://schemas.microsoft.com/office/powerpoint/2010/main" val="3586787697"/>
+      </p:ext>
+    </p:extLst>
+  </p:cSld>
+  <p:clrMapOvr>
+    <a:masterClrMapping/>
+  </p:clrMapOvr>
+</p:sld>
+</file>
+
+<file path=ppt/slides/slide7.xml><?xml version="1.0" encoding="utf-8"?>
+<p:sld xmlns:a="http://schemas.openxmlformats.org/drawingml/2006/main" xmlns:r="http://schemas.openxmlformats.org/officeDocument/2006/relationships" xmlns:p="http://schemas.openxmlformats.org/presentationml/2006/main">
+  <p:cSld>
+    <p:spTree>
+      <p:nvGrpSpPr>
+        <p:cNvPr id="1" name=""/>
+        <p:cNvGrpSpPr/>
+        <p:nvPr/>
+      </p:nvGrpSpPr>
+      <p:grpSpPr>
+        <a:xfrm>
+          <a:off x="0" y="0"/>
+          <a:ext cx="0" cy="0"/>
+          <a:chOff x="0" y="0"/>
+          <a:chExt cx="0" cy="0"/>
+        </a:xfrm>
+      </p:grpSpPr>
+      <p:sp>
+        <p:nvSpPr>
+          <p:cNvPr id="5" name="Title 4"/>
+          <p:cNvSpPr>
+            <a:spLocks noGrp="1"/>
+          </p:cNvSpPr>
+          <p:nvPr>
+            <p:ph type="title"/>
+          </p:nvPr>
+        </p:nvSpPr>
+        <p:spPr>
+          <a:xfrm>
+            <a:off x="457200" y="274638"/>
+            <a:ext cx="8229600" cy="962491"/>
+          </a:xfrm>
+        </p:spPr>
+        <p:txBody>
+          <a:bodyPr>
+            <a:normAutofit/>
+          </a:bodyPr>
+          <a:lstStyle/>
+          <a:p>
+            <a:r>
+              <a:rPr lang="en-US" dirty="0">
+                <a:solidFill>
+                  <a:srgbClr val="0208F2"/>
+                </a:solidFill>
+              </a:rPr>
+              <a:t>Customize the Default Theme</a:t>
+            </a:r>
+          </a:p>
+        </p:txBody>
+      </p:sp>
+      <p:sp>
+        <p:nvSpPr>
+          <p:cNvPr id="6" name="Content Placeholder 5"/>
+          <p:cNvSpPr>
+            <a:spLocks noGrp="1"/>
+          </p:cNvSpPr>
+          <p:nvPr>
+            <p:ph idx="1"/>
+          </p:nvPr>
+        </p:nvSpPr>
+        <p:spPr>
+          <a:xfrm>
+            <a:off x="457200" y="1237129"/>
+            <a:ext cx="8229600" cy="4861414"/>
+          </a:xfrm>
+        </p:spPr>
+        <p:txBody>
+          <a:bodyPr>
+            <a:normAutofit fontScale="77500" lnSpcReduction="20000"/>
+          </a:bodyPr>
+          <a:lstStyle/>
+          <a:p>
+            <a:r>
+              <a:rPr lang="en-US" dirty="0"/>
+              <a:t>When you create a project with Android Studio, it applies a material design theme to your app by default, as defined in your project's </a:t>
+            </a:r>
+            <a:r>
+              <a:rPr lang="en-US" dirty="0" err="1"/>
+              <a:t>styles.xml</a:t>
+            </a:r>
+            <a:r>
+              <a:rPr lang="en-US" dirty="0"/>
+              <a:t> file. </a:t>
+            </a:r>
+          </a:p>
+          <a:p>
+            <a:r>
+              <a:rPr lang="en-US" dirty="0"/>
+              <a:t>This </a:t>
+            </a:r>
+            <a:r>
+              <a:rPr lang="en-US" dirty="0" err="1"/>
+              <a:t>AppTheme</a:t>
+            </a:r>
+            <a:r>
+              <a:rPr lang="en-US" dirty="0"/>
+              <a:t> style extends a theme from the support library and includes overrides for color attributes For example, your </a:t>
+            </a:r>
+            <a:r>
+              <a:rPr lang="en-US" dirty="0" err="1"/>
+              <a:t>styles.xml</a:t>
+            </a:r>
+            <a:r>
+              <a:rPr lang="en-US" dirty="0"/>
+              <a:t> file should look similar to this:</a:t>
+            </a:r>
+          </a:p>
+          <a:p>
+            <a:pPr marL="0" indent="0">
+              <a:buNone/>
+            </a:pPr>
+            <a:endParaRPr lang="en-US" dirty="0"/>
+          </a:p>
+          <a:p>
+            <a:pPr marL="0" indent="0">
+              <a:buNone/>
+            </a:pPr>
+            <a:r>
+              <a:rPr lang="en-US" dirty="0"/>
+              <a:t>&lt;style</a:t>
+            </a:r>
+            <a:r>
+              <a:rPr lang="en-US" sz="2800" dirty="0"/>
+              <a:t> </a:t>
+            </a:r>
+            <a:r>
+              <a:rPr lang="en-US" dirty="0"/>
+              <a:t>name</a:t>
+            </a:r>
+            <a:r>
+              <a:rPr lang="en-US" sz="2800" dirty="0"/>
+              <a:t>=</a:t>
+            </a:r>
+            <a:r>
+              <a:rPr lang="en-US" dirty="0"/>
+              <a:t>"</a:t>
+            </a:r>
+            <a:r>
+              <a:rPr lang="en-US" dirty="0" err="1"/>
+              <a:t>AppTheme</a:t>
+            </a:r>
+            <a:r>
+              <a:rPr lang="en-US" dirty="0"/>
+              <a:t>"</a:t>
+            </a:r>
+            <a:r>
+              <a:rPr lang="en-US" sz="2800" dirty="0"/>
+              <a:t> </a:t>
+            </a:r>
+            <a:r>
+              <a:rPr lang="en-US" dirty="0"/>
+              <a:t>parent</a:t>
+            </a:r>
+            <a:r>
+              <a:rPr lang="en-US" sz="2800" dirty="0"/>
+              <a:t>=</a:t>
+            </a:r>
+            <a:r>
+              <a:rPr lang="en-US" dirty="0"/>
+              <a:t>"</a:t>
+            </a:r>
+            <a:r>
+              <a:rPr lang="en-US" dirty="0" err="1"/>
+              <a:t>Theme.AppCompat.Light.DarkActionBar</a:t>
+            </a:r>
+            <a:r>
+              <a:rPr lang="en-US" dirty="0"/>
+              <a:t>"&gt;</a:t>
+            </a:r>
+            <a:br>
+              <a:rPr lang="en-US" sz="2800" dirty="0"/>
+            </a:br>
+            <a:r>
+              <a:rPr lang="en-US" sz="2800" dirty="0"/>
+              <a:t>    </a:t>
+            </a:r>
+            <a:r>
+              <a:rPr lang="en-US" dirty="0"/>
+              <a:t>&lt;!--</a:t>
+            </a:r>
+            <a:r>
+              <a:rPr lang="en-US" sz="2800" dirty="0"/>
+              <a:t> Customize your theme here. </a:t>
+            </a:r>
+            <a:r>
+              <a:rPr lang="en-US" dirty="0"/>
+              <a:t>--&gt;</a:t>
+            </a:r>
+            <a:br>
+              <a:rPr lang="en-US" sz="2800" dirty="0"/>
+            </a:br>
+            <a:r>
+              <a:rPr lang="en-US" sz="2800" dirty="0"/>
+              <a:t>    &lt;item name=</a:t>
+            </a:r>
+            <a:r>
+              <a:rPr lang="en-US" dirty="0"/>
+              <a:t>"</a:t>
+            </a:r>
+            <a:r>
+              <a:rPr lang="en-US" dirty="0" err="1"/>
+              <a:t>colorPrimary</a:t>
+            </a:r>
+            <a:r>
+              <a:rPr lang="en-US" dirty="0"/>
+              <a:t>"</a:t>
+            </a:r>
+            <a:r>
+              <a:rPr lang="en-US" sz="2800" dirty="0"/>
+              <a:t>&gt;@color/</a:t>
+            </a:r>
+            <a:r>
+              <a:rPr lang="en-US" sz="2800" dirty="0" err="1"/>
+              <a:t>colorPrimary</a:t>
+            </a:r>
+            <a:r>
+              <a:rPr lang="en-US" sz="2800" dirty="0"/>
+              <a:t>&lt;/item&gt;</a:t>
+            </a:r>
+            <a:br>
+              <a:rPr lang="en-US" sz="2800" dirty="0"/>
+            </a:br>
+            <a:r>
+              <a:rPr lang="en-US" sz="2800" dirty="0"/>
+              <a:t>    &lt;item name=</a:t>
+            </a:r>
+            <a:r>
+              <a:rPr lang="en-US" dirty="0"/>
+              <a:t>"</a:t>
+            </a:r>
+            <a:r>
+              <a:rPr lang="en-US" dirty="0" err="1"/>
+              <a:t>colorPrimaryDark</a:t>
+            </a:r>
+            <a:r>
+              <a:rPr lang="en-US" dirty="0"/>
+              <a:t>"</a:t>
+            </a:r>
+            <a:r>
+              <a:rPr lang="en-US" sz="2800" dirty="0"/>
+              <a:t>&gt;@color/</a:t>
+            </a:r>
+            <a:r>
+              <a:rPr lang="en-US" sz="2800" dirty="0" err="1"/>
+              <a:t>colorPrimaryDark</a:t>
+            </a:r>
+            <a:r>
+              <a:rPr lang="en-US" sz="2800" dirty="0"/>
+              <a:t>&lt;/item&gt;</a:t>
+            </a:r>
+            <a:br>
+              <a:rPr lang="en-US" sz="2800" dirty="0"/>
+            </a:br>
+            <a:r>
+              <a:rPr lang="en-US" sz="2800" dirty="0"/>
+              <a:t>    &lt;item name=</a:t>
+            </a:r>
+            <a:r>
+              <a:rPr lang="en-US" dirty="0"/>
+              <a:t>"</a:t>
+            </a:r>
+            <a:r>
+              <a:rPr lang="en-US" dirty="0" err="1"/>
+              <a:t>colorAccent</a:t>
+            </a:r>
+            <a:r>
+              <a:rPr lang="en-US" dirty="0"/>
+              <a:t>"</a:t>
+            </a:r>
+            <a:r>
+              <a:rPr lang="en-US" sz="2800" dirty="0"/>
+              <a:t>&gt;@color/</a:t>
+            </a:r>
+            <a:r>
+              <a:rPr lang="en-US" sz="2800" dirty="0" err="1"/>
+              <a:t>colorAccent</a:t>
+            </a:r>
+            <a:r>
+              <a:rPr lang="en-US" sz="2800" dirty="0"/>
+              <a:t>&lt;/item&gt;</a:t>
+            </a:r>
+            <a:br>
+              <a:rPr lang="en-US" sz="2800" dirty="0"/>
+            </a:br>
+            <a:r>
+              <a:rPr lang="en-US" dirty="0"/>
+              <a:t>&lt;/style&gt;</a:t>
+            </a:r>
+            <a:endParaRPr lang="en-US" sz="2600" dirty="0"/>
+          </a:p>
+        </p:txBody>
+      </p:sp>
+    </p:spTree>
+    <p:extLst>
+      <p:ext uri="{BB962C8B-B14F-4D97-AF65-F5344CB8AC3E}">
+        <p14:creationId xmlns:p14="http://schemas.microsoft.com/office/powerpoint/2010/main" val="4042584151"/>
+      </p:ext>
+    </p:extLst>
+  </p:cSld>
+  <p:clrMapOvr>
+    <a:masterClrMapping/>
+  </p:clrMapOvr>
+</p:sld>
+</file>
+
+<file path=ppt/slides/slide8.xml><?xml version="1.0" encoding="utf-8"?>
+<p:sld xmlns:a="http://schemas.openxmlformats.org/drawingml/2006/main" xmlns:r="http://schemas.openxmlformats.org/officeDocument/2006/relationships" xmlns:p="http://schemas.openxmlformats.org/presentationml/2006/main">
+  <p:cSld>
+    <p:spTree>
+      <p:nvGrpSpPr>
+        <p:cNvPr id="1" name=""/>
+        <p:cNvGrpSpPr/>
+        <p:nvPr/>
+      </p:nvGrpSpPr>
+      <p:grpSpPr>
+        <a:xfrm>
+          <a:off x="0" y="0"/>
+          <a:ext cx="0" cy="0"/>
+          <a:chOff x="0" y="0"/>
+          <a:chExt cx="0" cy="0"/>
+        </a:xfrm>
+      </p:grpSpPr>
+      <p:sp>
+        <p:nvSpPr>
+          <p:cNvPr id="5" name="Title 4"/>
+          <p:cNvSpPr>
+            <a:spLocks noGrp="1"/>
+          </p:cNvSpPr>
+          <p:nvPr>
+            <p:ph type="title"/>
+          </p:nvPr>
+        </p:nvSpPr>
+        <p:spPr>
+          <a:xfrm>
+            <a:off x="457200" y="274638"/>
+            <a:ext cx="8229600" cy="962491"/>
+          </a:xfrm>
+        </p:spPr>
+        <p:txBody>
+          <a:bodyPr/>
+          <a:lstStyle/>
+          <a:p>
+            <a:r>
+              <a:rPr lang="en-US" dirty="0">
+                <a:solidFill>
+                  <a:srgbClr val="0208F2"/>
+                </a:solidFill>
+              </a:rPr>
+              <a:t>Common Themes</a:t>
+            </a:r>
+          </a:p>
+        </p:txBody>
+      </p:sp>
+      <p:sp>
+        <p:nvSpPr>
+          <p:cNvPr id="6" name="Content Placeholder 5"/>
+          <p:cNvSpPr>
+            <a:spLocks noGrp="1"/>
+          </p:cNvSpPr>
+          <p:nvPr>
+            <p:ph idx="1"/>
+          </p:nvPr>
+        </p:nvSpPr>
+        <p:spPr>
+          <a:xfrm>
+            <a:off x="457200" y="1237129"/>
+            <a:ext cx="8229600" cy="4861414"/>
+          </a:xfrm>
+        </p:spPr>
+        <p:txBody>
+          <a:bodyPr>
+            <a:normAutofit/>
+          </a:bodyPr>
+          <a:lstStyle/>
+          <a:p>
+            <a:br>
+              <a:rPr lang="en-US" sz="2800" dirty="0"/>
+            </a:br>
+            <a:endParaRPr lang="en-US" sz="2600" dirty="0"/>
+          </a:p>
+        </p:txBody>
+      </p:sp>
+    </p:spTree>
+    <p:extLst>
+      <p:ext uri="{BB962C8B-B14F-4D97-AF65-F5344CB8AC3E}">
+        <p14:creationId xmlns:p14="http://schemas.microsoft.com/office/powerpoint/2010/main" val="704401125"/>
+      </p:ext>
+    </p:extLst>
+  </p:cSld>
+  <p:clrMapOvr>
+    <a:masterClrMapping/>
+  </p:clrMapOvr>
+</p:sld>
+</file>
+
+<file path=ppt/slides/slide9.xml><?xml version="1.0" encoding="utf-8"?>
+<p:sld xmlns:a="http://schemas.openxmlformats.org/drawingml/2006/main" xmlns:r="http://schemas.openxmlformats.org/officeDocument/2006/relationships" xmlns:p="http://schemas.openxmlformats.org/presentationml/2006/main">
+  <p:cSld>
+    <p:spTree>
+      <p:nvGrpSpPr>
+        <p:cNvPr id="1" name=""/>
+        <p:cNvGrpSpPr/>
+        <p:nvPr/>
+      </p:nvGrpSpPr>
+      <p:grpSpPr>
+        <a:xfrm>
+          <a:off x="0" y="0"/>
+          <a:ext cx="0" cy="0"/>
+          <a:chOff x="0" y="0"/>
+          <a:chExt cx="0" cy="0"/>
+        </a:xfrm>
+      </p:grpSpPr>
+      <p:sp>
+        <p:nvSpPr>
           <p:cNvPr id="8" name="Date Placeholder 2"/>
           <p:cNvSpPr>
             <a:spLocks noGrp="1"/>
@@ -5394,7 +7573,7 @@
               <a:pPr algn="r">
                 <a:defRPr/>
               </a:pPr>
-              <a:t>4</a:t>
+              <a:t>9</a:t>
             </a:fld>
             <a:endParaRPr lang="en-US" sz="900">
               <a:latin typeface="Arial Narrow" pitchFamily="34" charset="0"/>
@@ -5424,7 +7603,7 @@
           <a:graphicData uri="http://schemas.openxmlformats.org/presentationml/2006/ole">
             <mc:AlternateContent xmlns:mc="http://schemas.openxmlformats.org/markup-compatibility/2006">
               <mc:Choice xmlns:v="urn:schemas-microsoft-com:vml" Requires="v">
-                <p:oleObj spid="_x0000_s1032" name="Document" r:id="rId4" imgW="7487205" imgH="5817491" progId="Word.Document.12">
+                <p:oleObj spid="_x0000_s1036" name="Document" r:id="rId4" imgW="7487205" imgH="5817491" progId="Word.Document.12">
                   <p:embed/>
                 </p:oleObj>
               </mc:Choice>
@@ -5463,612 +7642,6 @@
     <p:extLst>
       <p:ext uri="{BB962C8B-B14F-4D97-AF65-F5344CB8AC3E}">
         <p14:creationId xmlns:p14="http://schemas.microsoft.com/office/powerpoint/2010/main" val="2618107782"/>
-      </p:ext>
-    </p:extLst>
-  </p:cSld>
-  <p:clrMapOvr>
-    <a:masterClrMapping/>
-  </p:clrMapOvr>
-</p:sld>
-</file>
-
-<file path=ppt/slides/slide5.xml><?xml version="1.0" encoding="utf-8"?>
-<p:sld xmlns:a="http://schemas.openxmlformats.org/drawingml/2006/main" xmlns:r="http://schemas.openxmlformats.org/officeDocument/2006/relationships" xmlns:p="http://schemas.openxmlformats.org/presentationml/2006/main">
-  <p:cSld>
-    <p:spTree>
-      <p:nvGrpSpPr>
-        <p:cNvPr id="1" name=""/>
-        <p:cNvGrpSpPr/>
-        <p:nvPr/>
-      </p:nvGrpSpPr>
-      <p:grpSpPr>
-        <a:xfrm>
-          <a:off x="0" y="0"/>
-          <a:ext cx="0" cy="0"/>
-          <a:chOff x="0" y="0"/>
-          <a:chExt cx="0" cy="0"/>
-        </a:xfrm>
-      </p:grpSpPr>
-      <p:sp>
-        <p:nvSpPr>
-          <p:cNvPr id="2" name="Title 1"/>
-          <p:cNvSpPr>
-            <a:spLocks noGrp="1"/>
-          </p:cNvSpPr>
-          <p:nvPr>
-            <p:ph type="title"/>
-          </p:nvPr>
-        </p:nvSpPr>
-        <p:spPr>
-          <a:xfrm>
-            <a:off x="457200" y="274638"/>
-            <a:ext cx="8229600" cy="876430"/>
-          </a:xfrm>
-        </p:spPr>
-        <p:txBody>
-          <a:bodyPr/>
-          <a:lstStyle/>
-          <a:p>
-            <a:r>
-              <a:rPr lang="en-US" dirty="0">
-                <a:solidFill>
-                  <a:srgbClr val="0208F2"/>
-                </a:solidFill>
-              </a:rPr>
-              <a:t>Material Design</a:t>
-            </a:r>
-          </a:p>
-        </p:txBody>
-      </p:sp>
-      <p:sp>
-        <p:nvSpPr>
-          <p:cNvPr id="3" name="Content Placeholder 2"/>
-          <p:cNvSpPr>
-            <a:spLocks noGrp="1"/>
-          </p:cNvSpPr>
-          <p:nvPr>
-            <p:ph idx="1"/>
-          </p:nvPr>
-        </p:nvSpPr>
-        <p:spPr>
-          <a:xfrm>
-            <a:off x="457200" y="1151068"/>
-            <a:ext cx="8229600" cy="4975095"/>
-          </a:xfrm>
-        </p:spPr>
-        <p:txBody>
-          <a:bodyPr>
-            <a:normAutofit fontScale="85000" lnSpcReduction="20000"/>
-          </a:bodyPr>
-          <a:lstStyle/>
-          <a:p>
-            <a:r>
-              <a:rPr lang="en-US" dirty="0"/>
-              <a:t>Material design is a comprehensive guide for visual, motion, and interaction. To use material design in your Android apps, follow the guidelines described in the material design specification and use the components and functionality available in Android 5.0, Lollipop (API level 21) and newer.</a:t>
-            </a:r>
-          </a:p>
-          <a:p>
-            <a:endParaRPr lang="en-US" dirty="0"/>
-          </a:p>
-          <a:p>
-            <a:r>
-              <a:rPr lang="en-US" dirty="0"/>
-              <a:t>Material design apps have the following elements:</a:t>
-            </a:r>
-          </a:p>
-          <a:p>
-            <a:pPr lvl="1"/>
-            <a:r>
-              <a:rPr lang="en-US" dirty="0"/>
-              <a:t>The material theme</a:t>
-            </a:r>
-          </a:p>
-          <a:p>
-            <a:pPr lvl="1"/>
-            <a:r>
-              <a:rPr lang="en-US" dirty="0"/>
-              <a:t>Widgets for cards and lists</a:t>
-            </a:r>
-          </a:p>
-          <a:p>
-            <a:pPr lvl="1"/>
-            <a:r>
-              <a:rPr lang="en-US" dirty="0"/>
-              <a:t>Custom shadows and view clipping</a:t>
-            </a:r>
-          </a:p>
-          <a:p>
-            <a:pPr lvl="1"/>
-            <a:r>
-              <a:rPr lang="en-US" dirty="0"/>
-              <a:t>Vector drawables</a:t>
-            </a:r>
-          </a:p>
-          <a:p>
-            <a:pPr lvl="1"/>
-            <a:r>
-              <a:rPr lang="en-US" dirty="0"/>
-              <a:t>Custom animations</a:t>
-            </a:r>
-          </a:p>
-          <a:p>
-            <a:endParaRPr lang="en-US" dirty="0"/>
-          </a:p>
-        </p:txBody>
-      </p:sp>
-    </p:spTree>
-    <p:extLst>
-      <p:ext uri="{BB962C8B-B14F-4D97-AF65-F5344CB8AC3E}">
-        <p14:creationId xmlns:p14="http://schemas.microsoft.com/office/powerpoint/2010/main" val="3709605184"/>
-      </p:ext>
-    </p:extLst>
-  </p:cSld>
-  <p:clrMapOvr>
-    <a:masterClrMapping/>
-  </p:clrMapOvr>
-</p:sld>
-</file>
-
-<file path=ppt/slides/slide6.xml><?xml version="1.0" encoding="utf-8"?>
-<p:sld xmlns:a="http://schemas.openxmlformats.org/drawingml/2006/main" xmlns:r="http://schemas.openxmlformats.org/officeDocument/2006/relationships" xmlns:p="http://schemas.openxmlformats.org/presentationml/2006/main">
-  <p:cSld>
-    <p:spTree>
-      <p:nvGrpSpPr>
-        <p:cNvPr id="1" name=""/>
-        <p:cNvGrpSpPr/>
-        <p:nvPr/>
-      </p:nvGrpSpPr>
-      <p:grpSpPr>
-        <a:xfrm>
-          <a:off x="0" y="0"/>
-          <a:ext cx="0" cy="0"/>
-          <a:chOff x="0" y="0"/>
-          <a:chExt cx="0" cy="0"/>
-        </a:xfrm>
-      </p:grpSpPr>
-      <p:sp>
-        <p:nvSpPr>
-          <p:cNvPr id="2" name="Title 1"/>
-          <p:cNvSpPr>
-            <a:spLocks noGrp="1"/>
-          </p:cNvSpPr>
-          <p:nvPr>
-            <p:ph type="title"/>
-          </p:nvPr>
-        </p:nvSpPr>
-        <p:spPr/>
-        <p:txBody>
-          <a:bodyPr/>
-          <a:lstStyle/>
-          <a:p>
-            <a:r>
-              <a:rPr lang="en-US" dirty="0"/>
-              <a:t>Material Theme</a:t>
-            </a:r>
-          </a:p>
-        </p:txBody>
-      </p:sp>
-      <p:sp>
-        <p:nvSpPr>
-          <p:cNvPr id="3" name="Content Placeholder 2"/>
-          <p:cNvSpPr>
-            <a:spLocks noGrp="1"/>
-          </p:cNvSpPr>
-          <p:nvPr>
-            <p:ph sz="half" idx="1"/>
-          </p:nvPr>
-        </p:nvSpPr>
-        <p:spPr/>
-        <p:txBody>
-          <a:bodyPr>
-            <a:normAutofit lnSpcReduction="10000"/>
-          </a:bodyPr>
-          <a:lstStyle/>
-          <a:p>
-            <a:pPr marL="0" indent="0">
-              <a:buNone/>
-            </a:pPr>
-            <a:r>
-              <a:rPr lang="en-US" dirty="0"/>
-              <a:t>The material theme provides:</a:t>
-            </a:r>
-          </a:p>
-          <a:p>
-            <a:r>
-              <a:rPr lang="en-US" dirty="0"/>
-              <a:t>System widgets that let you set their color palette</a:t>
-            </a:r>
-          </a:p>
-          <a:p>
-            <a:r>
-              <a:rPr lang="en-US" dirty="0"/>
-              <a:t>Touch feedback animations for the system widgets</a:t>
-            </a:r>
-          </a:p>
-          <a:p>
-            <a:r>
-              <a:rPr lang="en-US" dirty="0"/>
-              <a:t>Activity transition animations</a:t>
-            </a:r>
-          </a:p>
-        </p:txBody>
-      </p:sp>
-      <p:pic>
-        <p:nvPicPr>
-          <p:cNvPr id="12" name="Content Placeholder 11"/>
-          <p:cNvPicPr>
-            <a:picLocks noGrp="1" noChangeAspect="1"/>
-          </p:cNvPicPr>
-          <p:nvPr>
-            <p:ph sz="half" idx="2"/>
-          </p:nvPr>
-        </p:nvPicPr>
-        <p:blipFill>
-          <a:blip r:embed="rId2"/>
-          <a:srcRect l="7526" r="7526"/>
-          <a:stretch>
-            <a:fillRect/>
-          </a:stretch>
-        </p:blipFill>
-        <p:spPr/>
-      </p:pic>
-    </p:spTree>
-    <p:extLst>
-      <p:ext uri="{BB962C8B-B14F-4D97-AF65-F5344CB8AC3E}">
-        <p14:creationId xmlns:p14="http://schemas.microsoft.com/office/powerpoint/2010/main" val="1099750604"/>
-      </p:ext>
-    </p:extLst>
-  </p:cSld>
-  <p:clrMapOvr>
-    <a:masterClrMapping/>
-  </p:clrMapOvr>
-</p:sld>
-</file>
-
-<file path=ppt/slides/slide7.xml><?xml version="1.0" encoding="utf-8"?>
-<p:sld xmlns:a="http://schemas.openxmlformats.org/drawingml/2006/main" xmlns:r="http://schemas.openxmlformats.org/officeDocument/2006/relationships" xmlns:p="http://schemas.openxmlformats.org/presentationml/2006/main">
-  <p:cSld>
-    <p:spTree>
-      <p:nvGrpSpPr>
-        <p:cNvPr id="1" name=""/>
-        <p:cNvGrpSpPr/>
-        <p:nvPr/>
-      </p:nvGrpSpPr>
-      <p:grpSpPr>
-        <a:xfrm>
-          <a:off x="0" y="0"/>
-          <a:ext cx="0" cy="0"/>
-          <a:chOff x="0" y="0"/>
-          <a:chExt cx="0" cy="0"/>
-        </a:xfrm>
-      </p:grpSpPr>
-      <p:sp>
-        <p:nvSpPr>
-          <p:cNvPr id="8" name="Title 7"/>
-          <p:cNvSpPr>
-            <a:spLocks noGrp="1"/>
-          </p:cNvSpPr>
-          <p:nvPr>
-            <p:ph type="title"/>
-          </p:nvPr>
-        </p:nvSpPr>
-        <p:spPr/>
-        <p:txBody>
-          <a:bodyPr/>
-          <a:lstStyle/>
-          <a:p>
-            <a:r>
-              <a:rPr lang="en-US" dirty="0"/>
-              <a:t>New Type of List View</a:t>
-            </a:r>
-          </a:p>
-        </p:txBody>
-      </p:sp>
-      <p:sp>
-        <p:nvSpPr>
-          <p:cNvPr id="9" name="Content Placeholder 8"/>
-          <p:cNvSpPr>
-            <a:spLocks noGrp="1"/>
-          </p:cNvSpPr>
-          <p:nvPr>
-            <p:ph sz="half" idx="1"/>
-          </p:nvPr>
-        </p:nvSpPr>
-        <p:spPr/>
-        <p:txBody>
-          <a:bodyPr>
-            <a:normAutofit lnSpcReduction="10000"/>
-          </a:bodyPr>
-          <a:lstStyle/>
-          <a:p>
-            <a:pPr marL="0" indent="0">
-              <a:buNone/>
-            </a:pPr>
-            <a:r>
-              <a:rPr lang="en-US" dirty="0"/>
-              <a:t>The </a:t>
-            </a:r>
-            <a:r>
-              <a:rPr lang="en-US" dirty="0" err="1"/>
-              <a:t>RecyclerView</a:t>
-            </a:r>
-            <a:r>
-              <a:rPr lang="en-US" dirty="0"/>
-              <a:t> class simplifies the display and handling of large data sets by providing:</a:t>
-            </a:r>
-          </a:p>
-          <a:p>
-            <a:r>
-              <a:rPr lang="en-US" dirty="0"/>
-              <a:t>Layout managers for positioning items</a:t>
-            </a:r>
-          </a:p>
-          <a:p>
-            <a:r>
-              <a:rPr lang="en-US" dirty="0"/>
-              <a:t>Default animations for common item operations, such as removal or addition of items</a:t>
-            </a:r>
-          </a:p>
-        </p:txBody>
-      </p:sp>
-      <p:pic>
-        <p:nvPicPr>
-          <p:cNvPr id="11" name="Content Placeholder 10"/>
-          <p:cNvPicPr>
-            <a:picLocks noGrp="1" noChangeAspect="1"/>
-          </p:cNvPicPr>
-          <p:nvPr>
-            <p:ph sz="half" idx="2"/>
-          </p:nvPr>
-        </p:nvPicPr>
-        <p:blipFill rotWithShape="1">
-          <a:blip r:embed="rId2"/>
-          <a:srcRect t="12512" b="12512"/>
-          <a:stretch/>
-        </p:blipFill>
-        <p:spPr>
-          <a:xfrm>
-            <a:off x="4648200" y="1681962"/>
-            <a:ext cx="4038600" cy="4444201"/>
-          </a:xfrm>
-        </p:spPr>
-      </p:pic>
-    </p:spTree>
-    <p:extLst>
-      <p:ext uri="{BB962C8B-B14F-4D97-AF65-F5344CB8AC3E}">
-        <p14:creationId xmlns:p14="http://schemas.microsoft.com/office/powerpoint/2010/main" val="3861671194"/>
-      </p:ext>
-    </p:extLst>
-  </p:cSld>
-  <p:clrMapOvr>
-    <a:masterClrMapping/>
-  </p:clrMapOvr>
-</p:sld>
-</file>
-
-<file path=ppt/slides/slide8.xml><?xml version="1.0" encoding="utf-8"?>
-<p:sld xmlns:a="http://schemas.openxmlformats.org/drawingml/2006/main" xmlns:r="http://schemas.openxmlformats.org/officeDocument/2006/relationships" xmlns:p="http://schemas.openxmlformats.org/presentationml/2006/main">
-  <p:cSld>
-    <p:spTree>
-      <p:nvGrpSpPr>
-        <p:cNvPr id="1" name=""/>
-        <p:cNvGrpSpPr/>
-        <p:nvPr/>
-      </p:nvGrpSpPr>
-      <p:grpSpPr>
-        <a:xfrm>
-          <a:off x="0" y="0"/>
-          <a:ext cx="0" cy="0"/>
-          <a:chOff x="0" y="0"/>
-          <a:chExt cx="0" cy="0"/>
-        </a:xfrm>
-      </p:grpSpPr>
-      <p:sp>
-        <p:nvSpPr>
-          <p:cNvPr id="2" name="Title 1"/>
-          <p:cNvSpPr>
-            <a:spLocks noGrp="1"/>
-          </p:cNvSpPr>
-          <p:nvPr>
-            <p:ph type="title"/>
-          </p:nvPr>
-        </p:nvSpPr>
-        <p:spPr/>
-        <p:txBody>
-          <a:bodyPr/>
-          <a:lstStyle/>
-          <a:p>
-            <a:r>
-              <a:rPr lang="en-US" dirty="0"/>
-              <a:t>Cards</a:t>
-            </a:r>
-          </a:p>
-        </p:txBody>
-      </p:sp>
-      <p:sp>
-        <p:nvSpPr>
-          <p:cNvPr id="3" name="Content Placeholder 2"/>
-          <p:cNvSpPr>
-            <a:spLocks noGrp="1"/>
-          </p:cNvSpPr>
-          <p:nvPr>
-            <p:ph sz="half" idx="1"/>
-          </p:nvPr>
-        </p:nvSpPr>
-        <p:spPr/>
-        <p:txBody>
-          <a:bodyPr/>
-          <a:lstStyle/>
-          <a:p>
-            <a:pPr marL="0" indent="0">
-              <a:buNone/>
-            </a:pPr>
-            <a:r>
-              <a:rPr lang="en-US" dirty="0" err="1"/>
-              <a:t>CardView</a:t>
-            </a:r>
-            <a:r>
-              <a:rPr lang="en-US" dirty="0"/>
-              <a:t> extends the </a:t>
-            </a:r>
-            <a:r>
-              <a:rPr lang="en-US" dirty="0" err="1"/>
-              <a:t>FrameLayout</a:t>
-            </a:r>
-            <a:r>
-              <a:rPr lang="en-US" dirty="0"/>
-              <a:t> class and lets you show information inside cards that have a consistent look across the platform. </a:t>
-            </a:r>
-            <a:r>
-              <a:rPr lang="en-US" dirty="0" err="1"/>
-              <a:t>CardView</a:t>
-            </a:r>
-            <a:r>
-              <a:rPr lang="en-US" dirty="0"/>
-              <a:t> widgets can have shadows and rounded corners.</a:t>
-            </a:r>
-          </a:p>
-        </p:txBody>
-      </p:sp>
-      <p:pic>
-        <p:nvPicPr>
-          <p:cNvPr id="5" name="Content Placeholder 4"/>
-          <p:cNvPicPr>
-            <a:picLocks noGrp="1" noChangeAspect="1"/>
-          </p:cNvPicPr>
-          <p:nvPr>
-            <p:ph sz="half" idx="2"/>
-          </p:nvPr>
-        </p:nvPicPr>
-        <p:blipFill>
-          <a:blip r:embed="rId2"/>
-          <a:srcRect l="-26115" r="-26115"/>
-          <a:stretch>
-            <a:fillRect/>
-          </a:stretch>
-        </p:blipFill>
-        <p:spPr>
-          <a:xfrm>
-            <a:off x="4261716" y="1167076"/>
-            <a:ext cx="4808831" cy="5389143"/>
-          </a:xfrm>
-        </p:spPr>
-      </p:pic>
-    </p:spTree>
-    <p:extLst>
-      <p:ext uri="{BB962C8B-B14F-4D97-AF65-F5344CB8AC3E}">
-        <p14:creationId xmlns:p14="http://schemas.microsoft.com/office/powerpoint/2010/main" val="4179464225"/>
-      </p:ext>
-    </p:extLst>
-  </p:cSld>
-  <p:clrMapOvr>
-    <a:masterClrMapping/>
-  </p:clrMapOvr>
-</p:sld>
-</file>
-
-<file path=ppt/slides/slide9.xml><?xml version="1.0" encoding="utf-8"?>
-<p:sld xmlns:a="http://schemas.openxmlformats.org/drawingml/2006/main" xmlns:r="http://schemas.openxmlformats.org/officeDocument/2006/relationships" xmlns:p="http://schemas.openxmlformats.org/presentationml/2006/main">
-  <p:cSld>
-    <p:spTree>
-      <p:nvGrpSpPr>
-        <p:cNvPr id="1" name=""/>
-        <p:cNvGrpSpPr/>
-        <p:nvPr/>
-      </p:nvGrpSpPr>
-      <p:grpSpPr>
-        <a:xfrm>
-          <a:off x="0" y="0"/>
-          <a:ext cx="0" cy="0"/>
-          <a:chOff x="0" y="0"/>
-          <a:chExt cx="0" cy="0"/>
-        </a:xfrm>
-      </p:grpSpPr>
-      <p:sp>
-        <p:nvSpPr>
-          <p:cNvPr id="5" name="Title 4"/>
-          <p:cNvSpPr>
-            <a:spLocks noGrp="1"/>
-          </p:cNvSpPr>
-          <p:nvPr>
-            <p:ph type="title"/>
-          </p:nvPr>
-        </p:nvSpPr>
-        <p:spPr/>
-        <p:txBody>
-          <a:bodyPr/>
-          <a:lstStyle/>
-          <a:p>
-            <a:r>
-              <a:rPr lang="en-US" dirty="0"/>
-              <a:t>Elevation: Shadows and Movement</a:t>
-            </a:r>
-          </a:p>
-        </p:txBody>
-      </p:sp>
-      <p:sp>
-        <p:nvSpPr>
-          <p:cNvPr id="6" name="Content Placeholder 5"/>
-          <p:cNvSpPr>
-            <a:spLocks noGrp="1"/>
-          </p:cNvSpPr>
-          <p:nvPr>
-            <p:ph idx="1"/>
-          </p:nvPr>
-        </p:nvSpPr>
-        <p:spPr/>
-        <p:txBody>
-          <a:bodyPr>
-            <a:normAutofit fontScale="85000" lnSpcReduction="10000"/>
-          </a:bodyPr>
-          <a:lstStyle/>
-          <a:p>
-            <a:pPr marL="0" indent="0">
-              <a:buNone/>
-            </a:pPr>
-            <a:r>
-              <a:rPr lang="en-US" dirty="0"/>
-              <a:t>Material design introduces elevation for UI elements. </a:t>
-            </a:r>
-          </a:p>
-          <a:p>
-            <a:r>
-              <a:rPr lang="en-US" dirty="0"/>
-              <a:t>Elevation helps users understand the relative importance of each element</a:t>
-            </a:r>
-          </a:p>
-          <a:p>
-            <a:r>
-              <a:rPr lang="en-US" dirty="0"/>
-              <a:t>The elevation of a view, represented by the Z property, determines the visual appearance of its shadow</a:t>
-            </a:r>
-          </a:p>
-          <a:p>
-            <a:pPr lvl="1"/>
-            <a:r>
-              <a:rPr lang="en-US" dirty="0"/>
-              <a:t>Views with higher Z values cast larger, softer shadows</a:t>
-            </a:r>
-          </a:p>
-          <a:p>
-            <a:pPr lvl="1"/>
-            <a:r>
-              <a:rPr lang="en-US" dirty="0"/>
-              <a:t>Views with higher Z values occlude views with lower Z values</a:t>
-            </a:r>
-          </a:p>
-          <a:p>
-            <a:r>
-              <a:rPr lang="en-US" dirty="0"/>
-              <a:t>Elevation can be used to create animations where widgets temporarily rise above the view plane when performing some action.</a:t>
-            </a:r>
-          </a:p>
-        </p:txBody>
-      </p:sp>
-    </p:spTree>
-    <p:extLst>
-      <p:ext uri="{BB962C8B-B14F-4D97-AF65-F5344CB8AC3E}">
-        <p14:creationId xmlns:p14="http://schemas.microsoft.com/office/powerpoint/2010/main" val="3196178850"/>
       </p:ext>
     </p:extLst>
   </p:cSld>

</xml_diff>